<commit_message>
Think the all the pains you had been suffered: Those are all lies
</commit_message>
<xml_diff>
--- a/pwrCtrl_Read_PPT.pptx
+++ b/pwrCtrl_Read_PPT.pptx
@@ -15,6 +15,7 @@
     <p:sldId id="266" r:id="rId9"/>
     <p:sldId id="267" r:id="rId10"/>
     <p:sldId id="268" r:id="rId11"/>
+    <p:sldId id="269" r:id="rId12"/>
   </p:sldIdLst>
   <p:sldSz cx="12192000" cy="6858000"/>
   <p:notesSz cx="6858000" cy="9144000"/>
@@ -252,7 +253,7 @@
           <a:p>
             <a:fld id="{D9D2B5F8-E8F3-4DF3-A7E7-8DDCC23A49BA}" type="datetimeFigureOut">
               <a:rPr lang="zh-CN" altLang="en-US" smtClean="0"/>
-              <a:t>2021/11/24</a:t>
+              <a:t>2021/11/25</a:t>
             </a:fld>
             <a:endParaRPr lang="zh-CN" altLang="en-US"/>
           </a:p>
@@ -422,7 +423,7 @@
           <a:p>
             <a:fld id="{D9D2B5F8-E8F3-4DF3-A7E7-8DDCC23A49BA}" type="datetimeFigureOut">
               <a:rPr lang="zh-CN" altLang="en-US" smtClean="0"/>
-              <a:t>2021/11/24</a:t>
+              <a:t>2021/11/25</a:t>
             </a:fld>
             <a:endParaRPr lang="zh-CN" altLang="en-US"/>
           </a:p>
@@ -602,7 +603,7 @@
           <a:p>
             <a:fld id="{D9D2B5F8-E8F3-4DF3-A7E7-8DDCC23A49BA}" type="datetimeFigureOut">
               <a:rPr lang="zh-CN" altLang="en-US" smtClean="0"/>
-              <a:t>2021/11/24</a:t>
+              <a:t>2021/11/25</a:t>
             </a:fld>
             <a:endParaRPr lang="zh-CN" altLang="en-US"/>
           </a:p>
@@ -772,7 +773,7 @@
           <a:p>
             <a:fld id="{D9D2B5F8-E8F3-4DF3-A7E7-8DDCC23A49BA}" type="datetimeFigureOut">
               <a:rPr lang="zh-CN" altLang="en-US" smtClean="0"/>
-              <a:t>2021/11/24</a:t>
+              <a:t>2021/11/25</a:t>
             </a:fld>
             <a:endParaRPr lang="zh-CN" altLang="en-US"/>
           </a:p>
@@ -1018,7 +1019,7 @@
           <a:p>
             <a:fld id="{D9D2B5F8-E8F3-4DF3-A7E7-8DDCC23A49BA}" type="datetimeFigureOut">
               <a:rPr lang="zh-CN" altLang="en-US" smtClean="0"/>
-              <a:t>2021/11/24</a:t>
+              <a:t>2021/11/25</a:t>
             </a:fld>
             <a:endParaRPr lang="zh-CN" altLang="en-US"/>
           </a:p>
@@ -1250,7 +1251,7 @@
           <a:p>
             <a:fld id="{D9D2B5F8-E8F3-4DF3-A7E7-8DDCC23A49BA}" type="datetimeFigureOut">
               <a:rPr lang="zh-CN" altLang="en-US" smtClean="0"/>
-              <a:t>2021/11/24</a:t>
+              <a:t>2021/11/25</a:t>
             </a:fld>
             <a:endParaRPr lang="zh-CN" altLang="en-US"/>
           </a:p>
@@ -1617,7 +1618,7 @@
           <a:p>
             <a:fld id="{D9D2B5F8-E8F3-4DF3-A7E7-8DDCC23A49BA}" type="datetimeFigureOut">
               <a:rPr lang="zh-CN" altLang="en-US" smtClean="0"/>
-              <a:t>2021/11/24</a:t>
+              <a:t>2021/11/25</a:t>
             </a:fld>
             <a:endParaRPr lang="zh-CN" altLang="en-US"/>
           </a:p>
@@ -1735,7 +1736,7 @@
           <a:p>
             <a:fld id="{D9D2B5F8-E8F3-4DF3-A7E7-8DDCC23A49BA}" type="datetimeFigureOut">
               <a:rPr lang="zh-CN" altLang="en-US" smtClean="0"/>
-              <a:t>2021/11/24</a:t>
+              <a:t>2021/11/25</a:t>
             </a:fld>
             <a:endParaRPr lang="zh-CN" altLang="en-US"/>
           </a:p>
@@ -1830,7 +1831,7 @@
           <a:p>
             <a:fld id="{D9D2B5F8-E8F3-4DF3-A7E7-8DDCC23A49BA}" type="datetimeFigureOut">
               <a:rPr lang="zh-CN" altLang="en-US" smtClean="0"/>
-              <a:t>2021/11/24</a:t>
+              <a:t>2021/11/25</a:t>
             </a:fld>
             <a:endParaRPr lang="zh-CN" altLang="en-US"/>
           </a:p>
@@ -2107,7 +2108,7 @@
           <a:p>
             <a:fld id="{D9D2B5F8-E8F3-4DF3-A7E7-8DDCC23A49BA}" type="datetimeFigureOut">
               <a:rPr lang="zh-CN" altLang="en-US" smtClean="0"/>
-              <a:t>2021/11/24</a:t>
+              <a:t>2021/11/25</a:t>
             </a:fld>
             <a:endParaRPr lang="zh-CN" altLang="en-US"/>
           </a:p>
@@ -2360,7 +2361,7 @@
           <a:p>
             <a:fld id="{D9D2B5F8-E8F3-4DF3-A7E7-8DDCC23A49BA}" type="datetimeFigureOut">
               <a:rPr lang="zh-CN" altLang="en-US" smtClean="0"/>
-              <a:t>2021/11/24</a:t>
+              <a:t>2021/11/25</a:t>
             </a:fld>
             <a:endParaRPr lang="zh-CN" altLang="en-US"/>
           </a:p>
@@ -2573,7 +2574,7 @@
           <a:p>
             <a:fld id="{D9D2B5F8-E8F3-4DF3-A7E7-8DDCC23A49BA}" type="datetimeFigureOut">
               <a:rPr lang="zh-CN" altLang="en-US" smtClean="0"/>
-              <a:t>2021/11/24</a:t>
+              <a:t>2021/11/25</a:t>
             </a:fld>
             <a:endParaRPr lang="zh-CN" altLang="en-US"/>
           </a:p>
@@ -3029,7 +3030,42 @@
                 <a:latin typeface="华文楷体" panose="02010600040101010101" pitchFamily="2" charset="-122"/>
                 <a:ea typeface="华文楷体" panose="02010600040101010101" pitchFamily="2" charset="-122"/>
               </a:rPr>
-              <a:t>刷新数据</a:t>
+              <a:t>刷新</a:t>
+            </a:r>
+            <a:r>
+              <a:rPr lang="zh-CN" altLang="en-US" sz="1400" smtClean="0">
+                <a:latin typeface="华文楷体" panose="02010600040101010101" pitchFamily="2" charset="-122"/>
+                <a:ea typeface="华文楷体" panose="02010600040101010101" pitchFamily="2" charset="-122"/>
+              </a:rPr>
+              <a:t>数据</a:t>
+            </a:r>
+            <a:r>
+              <a:rPr lang="en-US" altLang="zh-CN" sz="1400" smtClean="0">
+                <a:latin typeface="华文楷体" panose="02010600040101010101" pitchFamily="2" charset="-122"/>
+                <a:ea typeface="华文楷体" panose="02010600040101010101" pitchFamily="2" charset="-122"/>
+              </a:rPr>
+              <a:t>//lhm</a:t>
+            </a:r>
+            <a:r>
+              <a:rPr lang="en-US" altLang="zh-CN" sz="1400" smtClean="0">
+                <a:latin typeface="华文楷体" panose="02010600040101010101" pitchFamily="2" charset="-122"/>
+                <a:ea typeface="华文楷体" panose="02010600040101010101" pitchFamily="2" charset="-122"/>
+              </a:rPr>
+              <a:t>: </a:t>
+            </a:r>
+            <a:r>
+              <a:rPr lang="en-US" altLang="zh-CN" sz="1400" smtClean="0">
+                <a:latin typeface="华文楷体" panose="02010600040101010101" pitchFamily="2" charset="-122"/>
+                <a:ea typeface="华文楷体" panose="02010600040101010101" pitchFamily="2" charset="-122"/>
+              </a:rPr>
+              <a:t>AC</a:t>
+            </a:r>
+            <a:r>
+              <a:rPr lang="zh-CN" altLang="en-US" sz="1400" smtClean="0">
+                <a:latin typeface="华文楷体" panose="02010600040101010101" pitchFamily="2" charset="-122"/>
+                <a:ea typeface="华文楷体" panose="02010600040101010101" pitchFamily="2" charset="-122"/>
+              </a:rPr>
+              <a:t>接触器</a:t>
             </a:r>
             <a:endParaRPr lang="zh-CN" altLang="en-US" sz="1400">
               <a:latin typeface="华文楷体" panose="02010600040101010101" pitchFamily="2" charset="-122"/>
@@ -3085,7 +3121,21 @@
                 <a:latin typeface="华文楷体" panose="02010600040101010101" pitchFamily="2" charset="-122"/>
                 <a:ea typeface="华文楷体" panose="02010600040101010101" pitchFamily="2" charset="-122"/>
               </a:rPr>
-              <a:t>= {0};</a:t>
+              <a:t>= {0</a:t>
+            </a:r>
+            <a:r>
+              <a:rPr lang="en-US" altLang="zh-CN" sz="1400" smtClean="0">
+                <a:latin typeface="华文楷体" panose="02010600040101010101" pitchFamily="2" charset="-122"/>
+                <a:ea typeface="华文楷体" panose="02010600040101010101" pitchFamily="2" charset="-122"/>
+              </a:rPr>
+              <a:t>};			//lhm: </a:t>
+            </a:r>
+            <a:r>
+              <a:rPr lang="zh-CN" altLang="en-US" sz="1400" smtClean="0">
+                <a:latin typeface="华文楷体" panose="02010600040101010101" pitchFamily="2" charset="-122"/>
+                <a:ea typeface="华文楷体" panose="02010600040101010101" pitchFamily="2" charset="-122"/>
+              </a:rPr>
+              <a:t>整流柜控制参数</a:t>
             </a:r>
             <a:endParaRPr lang="zh-CN" altLang="en-US" sz="1400">
               <a:latin typeface="华文楷体" panose="02010600040101010101" pitchFamily="2" charset="-122"/>
@@ -3155,8 +3205,33 @@
                 <a:latin typeface="华文楷体" panose="02010600040101010101" pitchFamily="2" charset="-122"/>
                 <a:ea typeface="华文楷体" panose="02010600040101010101" pitchFamily="2" charset="-122"/>
               </a:rPr>
-              <a:t>整流柜参数</a:t>
-            </a:r>
+              <a:t>整流柜</a:t>
+            </a:r>
+            <a:r>
+              <a:rPr lang="zh-CN" altLang="en-US" sz="1400" smtClean="0">
+                <a:latin typeface="华文楷体" panose="02010600040101010101" pitchFamily="2" charset="-122"/>
+                <a:ea typeface="华文楷体" panose="02010600040101010101" pitchFamily="2" charset="-122"/>
+              </a:rPr>
+              <a:t>参数</a:t>
+            </a:r>
+            <a:r>
+              <a:rPr lang="en-US" altLang="zh-CN" sz="1400" smtClean="0">
+                <a:latin typeface="华文楷体" panose="02010600040101010101" pitchFamily="2" charset="-122"/>
+                <a:ea typeface="华文楷体" panose="02010600040101010101" pitchFamily="2" charset="-122"/>
+              </a:rPr>
+              <a:t>//lhm: </a:t>
+            </a:r>
+            <a:r>
+              <a:rPr lang="zh-CN" altLang="en-US" sz="1400" smtClean="0">
+                <a:latin typeface="华文楷体" panose="02010600040101010101" pitchFamily="2" charset="-122"/>
+                <a:ea typeface="华文楷体" panose="02010600040101010101" pitchFamily="2" charset="-122"/>
+              </a:rPr>
+              <a:t>设定参数</a:t>
+            </a:r>
+            <a:endParaRPr lang="zh-CN" altLang="en-US" sz="1400">
+              <a:latin typeface="华文楷体" panose="02010600040101010101" pitchFamily="2" charset="-122"/>
+              <a:ea typeface="华文楷体" panose="02010600040101010101" pitchFamily="2" charset="-122"/>
+            </a:endParaRPr>
           </a:p>
         </p:txBody>
       </p:sp>
@@ -3266,14 +3341,14 @@
                 <a:latin typeface="华文楷体" panose="02010600040101010101" pitchFamily="2" charset="-122"/>
                 <a:ea typeface="华文楷体" panose="02010600040101010101" pitchFamily="2" charset="-122"/>
               </a:rPr>
-              <a:t>static 	CHG_POLICY_RES_STRUCT 	g_resOld = {0};			</a:t>
+              <a:t>static 	CHG_POLICY_RES_STRUCT 	g_resOld = {0};		</a:t>
             </a:r>
             <a:r>
               <a:rPr lang="en-US" altLang="zh-CN" sz="1400" smtClean="0">
                 <a:latin typeface="华文楷体" panose="02010600040101010101" pitchFamily="2" charset="-122"/>
                 <a:ea typeface="华文楷体" panose="02010600040101010101" pitchFamily="2" charset="-122"/>
               </a:rPr>
-              <a:t>// </a:t>
+              <a:t>	// </a:t>
             </a:r>
             <a:r>
               <a:rPr lang="zh-CN" altLang="en-US" sz="1400">
@@ -3332,7 +3407,14 @@
                 <a:latin typeface="华文楷体" panose="02010600040101010101" pitchFamily="2" charset="-122"/>
                 <a:ea typeface="华文楷体" panose="02010600040101010101" pitchFamily="2" charset="-122"/>
               </a:rPr>
-              <a:t>] = {0};	// </a:t>
+              <a:t>] = {0</a:t>
+            </a:r>
+            <a:r>
+              <a:rPr lang="en-US" altLang="zh-CN" sz="1400" smtClean="0">
+                <a:latin typeface="华文楷体" panose="02010600040101010101" pitchFamily="2" charset="-122"/>
+                <a:ea typeface="华文楷体" panose="02010600040101010101" pitchFamily="2" charset="-122"/>
+              </a:rPr>
+              <a:t>};	// </a:t>
             </a:r>
             <a:r>
               <a:rPr lang="zh-CN" altLang="en-US" sz="1400">
@@ -3934,9 +4016,46 @@
           </a:p>
         </p:txBody>
       </p:sp>
+      <p:sp>
+        <p:nvSpPr>
+          <p:cNvPr id="3" name="文本框 2"/>
+          <p:cNvSpPr txBox="1"/>
+          <p:nvPr/>
+        </p:nvSpPr>
+        <p:spPr>
+          <a:xfrm>
+            <a:off x="9448796" y="3586148"/>
+            <a:ext cx="2161309" cy="307777"/>
+          </a:xfrm>
+          <a:prstGeom prst="rect">
+            <a:avLst/>
+          </a:prstGeom>
+          <a:noFill/>
+        </p:spPr>
+        <p:txBody>
+          <a:bodyPr wrap="square" rtlCol="0">
+            <a:spAutoFit/>
+          </a:bodyPr>
+          <a:lstStyle/>
+          <a:p>
+            <a:pPr algn="ctr"/>
+            <a:r>
+              <a:rPr lang="zh-CN" altLang="en-US" sz="1400" b="1" smtClean="0">
+                <a:latin typeface="华文楷体" panose="02010600040101010101" pitchFamily="2" charset="-122"/>
+                <a:ea typeface="华文楷体" panose="02010600040101010101" pitchFamily="2" charset="-122"/>
+              </a:rPr>
+              <a:t>接口提供的其他数据类型</a:t>
+            </a:r>
+            <a:endParaRPr lang="zh-CN" altLang="en-US" sz="1400" b="1">
+              <a:latin typeface="华文楷体" panose="02010600040101010101" pitchFamily="2" charset="-122"/>
+              <a:ea typeface="华文楷体" panose="02010600040101010101" pitchFamily="2" charset="-122"/>
+            </a:endParaRPr>
+          </a:p>
+        </p:txBody>
+      </p:sp>
       <p:pic>
         <p:nvPicPr>
-          <p:cNvPr id="2" name="图片 1"/>
+          <p:cNvPr id="4" name="图片 3"/>
           <p:cNvPicPr>
             <a:picLocks noChangeAspect="1"/>
           </p:cNvPicPr>
@@ -3950,67 +4069,6 @@
         </p:blipFill>
         <p:spPr>
           <a:xfrm>
-            <a:off x="2946400" y="3455030"/>
-            <a:ext cx="5449456" cy="3402969"/>
-          </a:xfrm>
-          <a:prstGeom prst="rect">
-            <a:avLst/>
-          </a:prstGeom>
-        </p:spPr>
-      </p:pic>
-      <p:sp>
-        <p:nvSpPr>
-          <p:cNvPr id="3" name="文本框 2"/>
-          <p:cNvSpPr txBox="1"/>
-          <p:nvPr/>
-        </p:nvSpPr>
-        <p:spPr>
-          <a:xfrm>
-            <a:off x="8395856" y="4976682"/>
-            <a:ext cx="2161309" cy="307777"/>
-          </a:xfrm>
-          <a:prstGeom prst="rect">
-            <a:avLst/>
-          </a:prstGeom>
-          <a:noFill/>
-        </p:spPr>
-        <p:txBody>
-          <a:bodyPr wrap="square" rtlCol="0">
-            <a:spAutoFit/>
-          </a:bodyPr>
-          <a:lstStyle/>
-          <a:p>
-            <a:pPr algn="ctr"/>
-            <a:r>
-              <a:rPr lang="zh-CN" altLang="en-US" sz="1400" b="1" smtClean="0">
-                <a:latin typeface="华文楷体" panose="02010600040101010101" pitchFamily="2" charset="-122"/>
-                <a:ea typeface="华文楷体" panose="02010600040101010101" pitchFamily="2" charset="-122"/>
-              </a:rPr>
-              <a:t>接口提供的其他数据类型</a:t>
-            </a:r>
-            <a:endParaRPr lang="zh-CN" altLang="en-US" sz="1400" b="1">
-              <a:latin typeface="华文楷体" panose="02010600040101010101" pitchFamily="2" charset="-122"/>
-              <a:ea typeface="华文楷体" panose="02010600040101010101" pitchFamily="2" charset="-122"/>
-            </a:endParaRPr>
-          </a:p>
-        </p:txBody>
-      </p:sp>
-      <p:pic>
-        <p:nvPicPr>
-          <p:cNvPr id="4" name="图片 3"/>
-          <p:cNvPicPr>
-            <a:picLocks noChangeAspect="1"/>
-          </p:cNvPicPr>
-          <p:nvPr/>
-        </p:nvPicPr>
-        <p:blipFill>
-          <a:blip r:embed="rId11"/>
-          <a:stretch>
-            <a:fillRect/>
-          </a:stretch>
-        </p:blipFill>
-        <p:spPr>
-          <a:xfrm>
             <a:off x="-3" y="1271933"/>
             <a:ext cx="8859486" cy="247685"/>
           </a:xfrm>
@@ -4073,7 +4131,7 @@
         </p:nvSpPr>
         <p:spPr>
           <a:xfrm>
-            <a:off x="8488218" y="4976682"/>
+            <a:off x="9545778" y="3574730"/>
             <a:ext cx="1967346" cy="307777"/>
           </a:xfrm>
           <a:prstGeom prst="rect">
@@ -4111,6 +4169,81 @@
           </a:p>
         </p:txBody>
       </p:sp>
+      <p:sp>
+        <p:nvSpPr>
+          <p:cNvPr id="7" name="文本框 6">
+            <a:hlinkClick r:id="rId11" action="ppaction://hlinksldjump"/>
+          </p:cNvPr>
+          <p:cNvSpPr txBox="1"/>
+          <p:nvPr/>
+        </p:nvSpPr>
+        <p:spPr>
+          <a:xfrm>
+            <a:off x="0" y="3574581"/>
+            <a:ext cx="1976582" cy="307777"/>
+          </a:xfrm>
+          <a:prstGeom prst="rect">
+            <a:avLst/>
+          </a:prstGeom>
+          <a:noFill/>
+          <a:ln>
+            <a:solidFill>
+              <a:schemeClr val="accent1"/>
+            </a:solidFill>
+          </a:ln>
+        </p:spPr>
+        <p:txBody>
+          <a:bodyPr wrap="square" rtlCol="0">
+            <a:spAutoFit/>
+          </a:bodyPr>
+          <a:lstStyle/>
+          <a:p>
+            <a:pPr algn="ctr"/>
+            <a:r>
+              <a:rPr lang="en-US" altLang="zh-CN" sz="1400" smtClean="0">
+                <a:latin typeface="华文楷体" panose="02010600040101010101" pitchFamily="2" charset="-122"/>
+                <a:ea typeface="华文楷体" panose="02010600040101010101" pitchFamily="2" charset="-122"/>
+              </a:rPr>
+              <a:t>PwrCtrl_Deal()</a:t>
+            </a:r>
+            <a:r>
+              <a:rPr lang="zh-CN" altLang="en-US" sz="1400" smtClean="0">
+                <a:latin typeface="华文楷体" panose="02010600040101010101" pitchFamily="2" charset="-122"/>
+                <a:ea typeface="华文楷体" panose="02010600040101010101" pitchFamily="2" charset="-122"/>
+              </a:rPr>
+              <a:t>控制流程</a:t>
+            </a:r>
+            <a:endParaRPr lang="zh-CN" altLang="en-US" sz="1400">
+              <a:latin typeface="华文楷体" panose="02010600040101010101" pitchFamily="2" charset="-122"/>
+              <a:ea typeface="华文楷体" panose="02010600040101010101" pitchFamily="2" charset="-122"/>
+            </a:endParaRPr>
+          </a:p>
+        </p:txBody>
+      </p:sp>
+      <p:pic>
+        <p:nvPicPr>
+          <p:cNvPr id="29" name="图片 28"/>
+          <p:cNvPicPr>
+            <a:picLocks noChangeAspect="1"/>
+          </p:cNvPicPr>
+          <p:nvPr/>
+        </p:nvPicPr>
+        <p:blipFill>
+          <a:blip r:embed="rId12"/>
+          <a:stretch>
+            <a:fillRect/>
+          </a:stretch>
+        </p:blipFill>
+        <p:spPr>
+          <a:xfrm>
+            <a:off x="692728" y="4018475"/>
+            <a:ext cx="10465360" cy="2784212"/>
+          </a:xfrm>
+          <a:prstGeom prst="rect">
+            <a:avLst/>
+          </a:prstGeom>
+        </p:spPr>
+      </p:pic>
     </p:spTree>
     <p:extLst>
       <p:ext uri="{BB962C8B-B14F-4D97-AF65-F5344CB8AC3E}">
@@ -4247,10 +4380,241 @@
           </a:p>
         </p:txBody>
       </p:sp>
+      <p:pic>
+        <p:nvPicPr>
+          <p:cNvPr id="5" name="图片 4"/>
+          <p:cNvPicPr>
+            <a:picLocks noChangeAspect="1"/>
+          </p:cNvPicPr>
+          <p:nvPr/>
+        </p:nvPicPr>
+        <p:blipFill>
+          <a:blip r:embed="rId2"/>
+          <a:stretch>
+            <a:fillRect/>
+          </a:stretch>
+        </p:blipFill>
+        <p:spPr>
+          <a:xfrm>
+            <a:off x="3172301" y="-10523"/>
+            <a:ext cx="5847398" cy="6868523"/>
+          </a:xfrm>
+          <a:prstGeom prst="rect">
+            <a:avLst/>
+          </a:prstGeom>
+        </p:spPr>
+      </p:pic>
+      <p:sp>
+        <p:nvSpPr>
+          <p:cNvPr id="6" name="动作按钮: 上一张 5">
+            <a:hlinkClick r:id="" action="ppaction://hlinkshowjump?jump=firstslide" highlightClick="1"/>
+          </p:cNvPr>
+          <p:cNvSpPr/>
+          <p:nvPr/>
+        </p:nvSpPr>
+        <p:spPr>
+          <a:xfrm>
+            <a:off x="11600873" y="6239164"/>
+            <a:ext cx="591127" cy="618836"/>
+          </a:xfrm>
+          <a:prstGeom prst="actionButtonReturn">
+            <a:avLst/>
+          </a:prstGeom>
+          <a:solidFill>
+            <a:schemeClr val="accent2"/>
+          </a:solidFill>
+        </p:spPr>
+        <p:style>
+          <a:lnRef idx="2">
+            <a:schemeClr val="accent1">
+              <a:shade val="50000"/>
+            </a:schemeClr>
+          </a:lnRef>
+          <a:fillRef idx="1">
+            <a:schemeClr val="accent1"/>
+          </a:fillRef>
+          <a:effectRef idx="0">
+            <a:schemeClr val="accent1"/>
+          </a:effectRef>
+          <a:fontRef idx="minor">
+            <a:schemeClr val="lt1"/>
+          </a:fontRef>
+        </p:style>
+        <p:txBody>
+          <a:bodyPr rtlCol="0" anchor="ctr"/>
+          <a:lstStyle/>
+          <a:p>
+            <a:pPr algn="ctr"/>
+            <a:endParaRPr lang="zh-CN" altLang="en-US"/>
+          </a:p>
+        </p:txBody>
+      </p:sp>
     </p:spTree>
     <p:extLst>
       <p:ext uri="{BB962C8B-B14F-4D97-AF65-F5344CB8AC3E}">
         <p14:creationId xmlns:p14="http://schemas.microsoft.com/office/powerpoint/2010/main" val="1086773769"/>
+      </p:ext>
+    </p:extLst>
+  </p:cSld>
+  <p:clrMapOvr>
+    <a:masterClrMapping/>
+  </p:clrMapOvr>
+  <p:timing>
+    <p:tnLst>
+      <p:par>
+        <p:cTn id="1" dur="indefinite" restart="never" nodeType="tmRoot"/>
+      </p:par>
+    </p:tnLst>
+  </p:timing>
+</p:sld>
+</file>
+
+<file path=ppt/slides/slide11.xml><?xml version="1.0" encoding="utf-8"?>
+<p:sld xmlns:a="http://schemas.openxmlformats.org/drawingml/2006/main" xmlns:r="http://schemas.openxmlformats.org/officeDocument/2006/relationships" xmlns:p="http://schemas.openxmlformats.org/presentationml/2006/main">
+  <p:cSld>
+    <p:spTree>
+      <p:nvGrpSpPr>
+        <p:cNvPr id="1" name=""/>
+        <p:cNvGrpSpPr/>
+        <p:nvPr/>
+      </p:nvGrpSpPr>
+      <p:grpSpPr>
+        <a:xfrm>
+          <a:off x="0" y="0"/>
+          <a:ext cx="0" cy="0"/>
+          <a:chOff x="0" y="0"/>
+          <a:chExt cx="0" cy="0"/>
+        </a:xfrm>
+      </p:grpSpPr>
+      <p:sp>
+        <p:nvSpPr>
+          <p:cNvPr id="2" name="矩形 1"/>
+          <p:cNvSpPr/>
+          <p:nvPr/>
+        </p:nvSpPr>
+        <p:spPr>
+          <a:xfrm>
+            <a:off x="0" y="0"/>
+            <a:ext cx="12192000" cy="471054"/>
+          </a:xfrm>
+          <a:prstGeom prst="rect">
+            <a:avLst/>
+          </a:prstGeom>
+        </p:spPr>
+        <p:style>
+          <a:lnRef idx="2">
+            <a:schemeClr val="accent1">
+              <a:shade val="50000"/>
+            </a:schemeClr>
+          </a:lnRef>
+          <a:fillRef idx="1">
+            <a:schemeClr val="accent1"/>
+          </a:fillRef>
+          <a:effectRef idx="0">
+            <a:schemeClr val="accent1"/>
+          </a:effectRef>
+          <a:fontRef idx="minor">
+            <a:schemeClr val="lt1"/>
+          </a:fontRef>
+        </p:style>
+        <p:txBody>
+          <a:bodyPr rtlCol="0" anchor="ctr"/>
+          <a:lstStyle/>
+          <a:p>
+            <a:pPr algn="ctr"/>
+            <a:endParaRPr lang="zh-CN" altLang="en-US"/>
+          </a:p>
+        </p:txBody>
+      </p:sp>
+      <p:sp>
+        <p:nvSpPr>
+          <p:cNvPr id="4" name="矩形 3"/>
+          <p:cNvSpPr/>
+          <p:nvPr/>
+        </p:nvSpPr>
+        <p:spPr>
+          <a:xfrm>
+            <a:off x="0" y="6386946"/>
+            <a:ext cx="12192000" cy="471054"/>
+          </a:xfrm>
+          <a:prstGeom prst="rect">
+            <a:avLst/>
+          </a:prstGeom>
+        </p:spPr>
+        <p:style>
+          <a:lnRef idx="2">
+            <a:schemeClr val="accent1">
+              <a:shade val="50000"/>
+            </a:schemeClr>
+          </a:lnRef>
+          <a:fillRef idx="1">
+            <a:schemeClr val="accent1"/>
+          </a:fillRef>
+          <a:effectRef idx="0">
+            <a:schemeClr val="accent1"/>
+          </a:effectRef>
+          <a:fontRef idx="minor">
+            <a:schemeClr val="lt1"/>
+          </a:fontRef>
+        </p:style>
+        <p:txBody>
+          <a:bodyPr rtlCol="0" anchor="ctr"/>
+          <a:lstStyle/>
+          <a:p>
+            <a:pPr algn="ctr"/>
+            <a:endParaRPr lang="zh-CN" altLang="en-US"/>
+          </a:p>
+        </p:txBody>
+      </p:sp>
+      <p:sp>
+        <p:nvSpPr>
+          <p:cNvPr id="5" name="动作按钮: 上一张 4">
+            <a:hlinkClick r:id="" action="ppaction://hlinkshowjump?jump=firstslide" highlightClick="1"/>
+          </p:cNvPr>
+          <p:cNvSpPr/>
+          <p:nvPr/>
+        </p:nvSpPr>
+        <p:spPr>
+          <a:xfrm>
+            <a:off x="11600873" y="6239164"/>
+            <a:ext cx="591127" cy="618836"/>
+          </a:xfrm>
+          <a:prstGeom prst="actionButtonReturn">
+            <a:avLst/>
+          </a:prstGeom>
+          <a:solidFill>
+            <a:schemeClr val="accent2"/>
+          </a:solidFill>
+        </p:spPr>
+        <p:style>
+          <a:lnRef idx="2">
+            <a:schemeClr val="accent1">
+              <a:shade val="50000"/>
+            </a:schemeClr>
+          </a:lnRef>
+          <a:fillRef idx="1">
+            <a:schemeClr val="accent1"/>
+          </a:fillRef>
+          <a:effectRef idx="0">
+            <a:schemeClr val="accent1"/>
+          </a:effectRef>
+          <a:fontRef idx="minor">
+            <a:schemeClr val="lt1"/>
+          </a:fontRef>
+        </p:style>
+        <p:txBody>
+          <a:bodyPr rtlCol="0" anchor="ctr"/>
+          <a:lstStyle/>
+          <a:p>
+            <a:pPr algn="ctr"/>
+            <a:endParaRPr lang="zh-CN" altLang="en-US"/>
+          </a:p>
+        </p:txBody>
+      </p:sp>
+    </p:spTree>
+    <p:extLst>
+      <p:ext uri="{BB962C8B-B14F-4D97-AF65-F5344CB8AC3E}">
+        <p14:creationId xmlns:p14="http://schemas.microsoft.com/office/powerpoint/2010/main" val="3299623576"/>
       </p:ext>
     </p:extLst>
   </p:cSld>

</xml_diff>

<commit_message>
Only One Thing That Stucks Me
</commit_message>
<xml_diff>
--- a/pwrCtrl_Read_PPT.pptx
+++ b/pwrCtrl_Read_PPT.pptx
@@ -253,7 +253,7 @@
           <a:p>
             <a:fld id="{D9D2B5F8-E8F3-4DF3-A7E7-8DDCC23A49BA}" type="datetimeFigureOut">
               <a:rPr lang="zh-CN" altLang="en-US" smtClean="0"/>
-              <a:t>2021/11/25</a:t>
+              <a:t>2021/12/2</a:t>
             </a:fld>
             <a:endParaRPr lang="zh-CN" altLang="en-US"/>
           </a:p>
@@ -423,7 +423,7 @@
           <a:p>
             <a:fld id="{D9D2B5F8-E8F3-4DF3-A7E7-8DDCC23A49BA}" type="datetimeFigureOut">
               <a:rPr lang="zh-CN" altLang="en-US" smtClean="0"/>
-              <a:t>2021/11/25</a:t>
+              <a:t>2021/12/2</a:t>
             </a:fld>
             <a:endParaRPr lang="zh-CN" altLang="en-US"/>
           </a:p>
@@ -603,7 +603,7 @@
           <a:p>
             <a:fld id="{D9D2B5F8-E8F3-4DF3-A7E7-8DDCC23A49BA}" type="datetimeFigureOut">
               <a:rPr lang="zh-CN" altLang="en-US" smtClean="0"/>
-              <a:t>2021/11/25</a:t>
+              <a:t>2021/12/2</a:t>
             </a:fld>
             <a:endParaRPr lang="zh-CN" altLang="en-US"/>
           </a:p>
@@ -773,7 +773,7 @@
           <a:p>
             <a:fld id="{D9D2B5F8-E8F3-4DF3-A7E7-8DDCC23A49BA}" type="datetimeFigureOut">
               <a:rPr lang="zh-CN" altLang="en-US" smtClean="0"/>
-              <a:t>2021/11/25</a:t>
+              <a:t>2021/12/2</a:t>
             </a:fld>
             <a:endParaRPr lang="zh-CN" altLang="en-US"/>
           </a:p>
@@ -1019,7 +1019,7 @@
           <a:p>
             <a:fld id="{D9D2B5F8-E8F3-4DF3-A7E7-8DDCC23A49BA}" type="datetimeFigureOut">
               <a:rPr lang="zh-CN" altLang="en-US" smtClean="0"/>
-              <a:t>2021/11/25</a:t>
+              <a:t>2021/12/2</a:t>
             </a:fld>
             <a:endParaRPr lang="zh-CN" altLang="en-US"/>
           </a:p>
@@ -1251,7 +1251,7 @@
           <a:p>
             <a:fld id="{D9D2B5F8-E8F3-4DF3-A7E7-8DDCC23A49BA}" type="datetimeFigureOut">
               <a:rPr lang="zh-CN" altLang="en-US" smtClean="0"/>
-              <a:t>2021/11/25</a:t>
+              <a:t>2021/12/2</a:t>
             </a:fld>
             <a:endParaRPr lang="zh-CN" altLang="en-US"/>
           </a:p>
@@ -1618,7 +1618,7 @@
           <a:p>
             <a:fld id="{D9D2B5F8-E8F3-4DF3-A7E7-8DDCC23A49BA}" type="datetimeFigureOut">
               <a:rPr lang="zh-CN" altLang="en-US" smtClean="0"/>
-              <a:t>2021/11/25</a:t>
+              <a:t>2021/12/2</a:t>
             </a:fld>
             <a:endParaRPr lang="zh-CN" altLang="en-US"/>
           </a:p>
@@ -1736,7 +1736,7 @@
           <a:p>
             <a:fld id="{D9D2B5F8-E8F3-4DF3-A7E7-8DDCC23A49BA}" type="datetimeFigureOut">
               <a:rPr lang="zh-CN" altLang="en-US" smtClean="0"/>
-              <a:t>2021/11/25</a:t>
+              <a:t>2021/12/2</a:t>
             </a:fld>
             <a:endParaRPr lang="zh-CN" altLang="en-US"/>
           </a:p>
@@ -1831,7 +1831,7 @@
           <a:p>
             <a:fld id="{D9D2B5F8-E8F3-4DF3-A7E7-8DDCC23A49BA}" type="datetimeFigureOut">
               <a:rPr lang="zh-CN" altLang="en-US" smtClean="0"/>
-              <a:t>2021/11/25</a:t>
+              <a:t>2021/12/2</a:t>
             </a:fld>
             <a:endParaRPr lang="zh-CN" altLang="en-US"/>
           </a:p>
@@ -2108,7 +2108,7 @@
           <a:p>
             <a:fld id="{D9D2B5F8-E8F3-4DF3-A7E7-8DDCC23A49BA}" type="datetimeFigureOut">
               <a:rPr lang="zh-CN" altLang="en-US" smtClean="0"/>
-              <a:t>2021/11/25</a:t>
+              <a:t>2021/12/2</a:t>
             </a:fld>
             <a:endParaRPr lang="zh-CN" altLang="en-US"/>
           </a:p>
@@ -2361,7 +2361,7 @@
           <a:p>
             <a:fld id="{D9D2B5F8-E8F3-4DF3-A7E7-8DDCC23A49BA}" type="datetimeFigureOut">
               <a:rPr lang="zh-CN" altLang="en-US" smtClean="0"/>
-              <a:t>2021/11/25</a:t>
+              <a:t>2021/12/2</a:t>
             </a:fld>
             <a:endParaRPr lang="zh-CN" altLang="en-US"/>
           </a:p>
@@ -2574,7 +2574,7 @@
           <a:p>
             <a:fld id="{D9D2B5F8-E8F3-4DF3-A7E7-8DDCC23A49BA}" type="datetimeFigureOut">
               <a:rPr lang="zh-CN" altLang="en-US" smtClean="0"/>
-              <a:t>2021/11/25</a:t>
+              <a:t>2021/12/2</a:t>
             </a:fld>
             <a:endParaRPr lang="zh-CN" altLang="en-US"/>
           </a:p>
@@ -3030,35 +3030,14 @@
                 <a:latin typeface="华文楷体" panose="02010600040101010101" pitchFamily="2" charset="-122"/>
                 <a:ea typeface="华文楷体" panose="02010600040101010101" pitchFamily="2" charset="-122"/>
               </a:rPr>
-              <a:t>刷新</a:t>
-            </a:r>
-            <a:r>
-              <a:rPr lang="zh-CN" altLang="en-US" sz="1400" smtClean="0">
-                <a:latin typeface="华文楷体" panose="02010600040101010101" pitchFamily="2" charset="-122"/>
-                <a:ea typeface="华文楷体" panose="02010600040101010101" pitchFamily="2" charset="-122"/>
-              </a:rPr>
-              <a:t>数据</a:t>
+              <a:t>刷新数据</a:t>
             </a:r>
             <a:r>
               <a:rPr lang="en-US" altLang="zh-CN" sz="1400" smtClean="0">
                 <a:latin typeface="华文楷体" panose="02010600040101010101" pitchFamily="2" charset="-122"/>
                 <a:ea typeface="华文楷体" panose="02010600040101010101" pitchFamily="2" charset="-122"/>
               </a:rPr>
-              <a:t>//lhm</a:t>
-            </a:r>
-            <a:r>
-              <a:rPr lang="en-US" altLang="zh-CN" sz="1400" smtClean="0">
-                <a:latin typeface="华文楷体" panose="02010600040101010101" pitchFamily="2" charset="-122"/>
-                <a:ea typeface="华文楷体" panose="02010600040101010101" pitchFamily="2" charset="-122"/>
-              </a:rPr>
-              <a:t>: </a:t>
-            </a:r>
-            <a:r>
-              <a:rPr lang="en-US" altLang="zh-CN" sz="1400" smtClean="0">
-                <a:latin typeface="华文楷体" panose="02010600040101010101" pitchFamily="2" charset="-122"/>
-                <a:ea typeface="华文楷体" panose="02010600040101010101" pitchFamily="2" charset="-122"/>
-              </a:rPr>
-              <a:t>AC</a:t>
+              <a:t>//lhm: AC</a:t>
             </a:r>
             <a:r>
               <a:rPr lang="zh-CN" altLang="en-US" sz="1400" smtClean="0">
@@ -4016,43 +3995,6 @@
           </a:p>
         </p:txBody>
       </p:sp>
-      <p:sp>
-        <p:nvSpPr>
-          <p:cNvPr id="3" name="文本框 2"/>
-          <p:cNvSpPr txBox="1"/>
-          <p:nvPr/>
-        </p:nvSpPr>
-        <p:spPr>
-          <a:xfrm>
-            <a:off x="9448796" y="3586148"/>
-            <a:ext cx="2161309" cy="307777"/>
-          </a:xfrm>
-          <a:prstGeom prst="rect">
-            <a:avLst/>
-          </a:prstGeom>
-          <a:noFill/>
-        </p:spPr>
-        <p:txBody>
-          <a:bodyPr wrap="square" rtlCol="0">
-            <a:spAutoFit/>
-          </a:bodyPr>
-          <a:lstStyle/>
-          <a:p>
-            <a:pPr algn="ctr"/>
-            <a:r>
-              <a:rPr lang="zh-CN" altLang="en-US" sz="1400" b="1" smtClean="0">
-                <a:latin typeface="华文楷体" panose="02010600040101010101" pitchFamily="2" charset="-122"/>
-                <a:ea typeface="华文楷体" panose="02010600040101010101" pitchFamily="2" charset="-122"/>
-              </a:rPr>
-              <a:t>接口提供的其他数据类型</a:t>
-            </a:r>
-            <a:endParaRPr lang="zh-CN" altLang="en-US" sz="1400" b="1">
-              <a:latin typeface="华文楷体" panose="02010600040101010101" pitchFamily="2" charset="-122"/>
-              <a:ea typeface="华文楷体" panose="02010600040101010101" pitchFamily="2" charset="-122"/>
-            </a:endParaRPr>
-          </a:p>
-        </p:txBody>
-      </p:sp>
       <p:pic>
         <p:nvPicPr>
           <p:cNvPr id="4" name="图片 3"/>
@@ -4125,52 +4067,6 @@
       </p:sp>
       <p:sp>
         <p:nvSpPr>
-          <p:cNvPr id="8" name="矩形 7"/>
-          <p:cNvSpPr/>
-          <p:nvPr/>
-        </p:nvSpPr>
-        <p:spPr>
-          <a:xfrm>
-            <a:off x="9545778" y="3574730"/>
-            <a:ext cx="1967346" cy="307777"/>
-          </a:xfrm>
-          <a:prstGeom prst="rect">
-            <a:avLst/>
-          </a:prstGeom>
-          <a:noFill/>
-          <a:ln>
-            <a:solidFill>
-              <a:srgbClr val="C00000"/>
-            </a:solidFill>
-          </a:ln>
-        </p:spPr>
-        <p:style>
-          <a:lnRef idx="2">
-            <a:schemeClr val="accent1">
-              <a:shade val="50000"/>
-            </a:schemeClr>
-          </a:lnRef>
-          <a:fillRef idx="1">
-            <a:schemeClr val="accent1"/>
-          </a:fillRef>
-          <a:effectRef idx="0">
-            <a:schemeClr val="accent1"/>
-          </a:effectRef>
-          <a:fontRef idx="minor">
-            <a:schemeClr val="lt1"/>
-          </a:fontRef>
-        </p:style>
-        <p:txBody>
-          <a:bodyPr rtlCol="0" anchor="ctr"/>
-          <a:lstStyle/>
-          <a:p>
-            <a:pPr algn="ctr"/>
-            <a:endParaRPr lang="zh-CN" altLang="en-US"/>
-          </a:p>
-        </p:txBody>
-      </p:sp>
-      <p:sp>
-        <p:nvSpPr>
           <p:cNvPr id="7" name="文本框 6">
             <a:hlinkClick r:id="rId11" action="ppaction://hlinksldjump"/>
           </p:cNvPr>
@@ -4244,6 +4140,103 @@
           </a:prstGeom>
         </p:spPr>
       </p:pic>
+      <p:sp>
+        <p:nvSpPr>
+          <p:cNvPr id="27" name="文本框 26"/>
+          <p:cNvSpPr txBox="1"/>
+          <p:nvPr/>
+        </p:nvSpPr>
+        <p:spPr>
+          <a:xfrm>
+            <a:off x="8859483" y="4349691"/>
+            <a:ext cx="2064328" cy="307777"/>
+          </a:xfrm>
+          <a:prstGeom prst="rect">
+            <a:avLst/>
+          </a:prstGeom>
+          <a:noFill/>
+        </p:spPr>
+        <p:txBody>
+          <a:bodyPr wrap="square" rtlCol="0">
+            <a:spAutoFit/>
+          </a:bodyPr>
+          <a:lstStyle/>
+          <a:p>
+            <a:pPr algn="ctr"/>
+            <a:r>
+              <a:rPr lang="en-US" altLang="zh-CN" sz="1400" b="1" smtClean="0">
+                <a:solidFill>
+                  <a:schemeClr val="bg1"/>
+                </a:solidFill>
+                <a:latin typeface="华文楷体" panose="02010600040101010101" pitchFamily="2" charset="-122"/>
+                <a:ea typeface="华文楷体" panose="02010600040101010101" pitchFamily="2" charset="-122"/>
+              </a:rPr>
+              <a:t>pwrCtrl.h</a:t>
+            </a:r>
+            <a:r>
+              <a:rPr lang="zh-CN" altLang="en-US" sz="1400" b="1" smtClean="0">
+                <a:solidFill>
+                  <a:schemeClr val="bg1"/>
+                </a:solidFill>
+                <a:latin typeface="华文楷体" panose="02010600040101010101" pitchFamily="2" charset="-122"/>
+                <a:ea typeface="华文楷体" panose="02010600040101010101" pitchFamily="2" charset="-122"/>
+              </a:rPr>
+              <a:t>其他数据类型</a:t>
+            </a:r>
+            <a:endParaRPr lang="zh-CN" altLang="en-US" sz="1400" b="1">
+              <a:solidFill>
+                <a:schemeClr val="bg1"/>
+              </a:solidFill>
+              <a:latin typeface="华文楷体" panose="02010600040101010101" pitchFamily="2" charset="-122"/>
+              <a:ea typeface="华文楷体" panose="02010600040101010101" pitchFamily="2" charset="-122"/>
+            </a:endParaRPr>
+          </a:p>
+        </p:txBody>
+      </p:sp>
+      <p:sp>
+        <p:nvSpPr>
+          <p:cNvPr id="28" name="文本框 27">
+            <a:hlinkClick r:id="rId13" action="ppaction://hlinksldjump"/>
+          </p:cNvPr>
+          <p:cNvSpPr txBox="1"/>
+          <p:nvPr/>
+        </p:nvSpPr>
+        <p:spPr>
+          <a:xfrm>
+            <a:off x="2304473" y="3574581"/>
+            <a:ext cx="1976582" cy="307777"/>
+          </a:xfrm>
+          <a:prstGeom prst="rect">
+            <a:avLst/>
+          </a:prstGeom>
+          <a:noFill/>
+          <a:ln>
+            <a:solidFill>
+              <a:schemeClr val="accent1"/>
+            </a:solidFill>
+          </a:ln>
+        </p:spPr>
+        <p:txBody>
+          <a:bodyPr wrap="square" rtlCol="0">
+            <a:spAutoFit/>
+          </a:bodyPr>
+          <a:lstStyle/>
+          <a:p>
+            <a:pPr algn="ctr"/>
+            <a:r>
+              <a:rPr lang="zh-CN" altLang="en-US" sz="1400" smtClean="0">
+                <a:latin typeface="华文楷体" panose="02010600040101010101" pitchFamily="2" charset="-122"/>
+                <a:ea typeface="华文楷体" panose="02010600040101010101" pitchFamily="2" charset="-122"/>
+              </a:rPr>
+              <a:t>继电器编号解释</a:t>
+            </a:r>
+            <a:endParaRPr lang="zh-CN" altLang="en-US" sz="1400">
+              <a:latin typeface="华文楷体" panose="02010600040101010101" pitchFamily="2" charset="-122"/>
+              <a:ea typeface="华文楷体" panose="02010600040101010101" pitchFamily="2" charset="-122"/>
+            </a:endParaRPr>
+          </a:p>
+        </p:txBody>
+      </p:sp>
     </p:spTree>
     <p:extLst>
       <p:ext uri="{BB962C8B-B14F-4D97-AF65-F5344CB8AC3E}">
@@ -4472,6 +4465,17 @@
 <file path=ppt/slides/slide11.xml><?xml version="1.0" encoding="utf-8"?>
 <p:sld xmlns:a="http://schemas.openxmlformats.org/drawingml/2006/main" xmlns:r="http://schemas.openxmlformats.org/officeDocument/2006/relationships" xmlns:p="http://schemas.openxmlformats.org/presentationml/2006/main">
   <p:cSld>
+    <p:bg>
+      <p:bgPr>
+        <a:solidFill>
+          <a:schemeClr val="accent4">
+            <a:lumMod val="20000"/>
+            <a:lumOff val="80000"/>
+          </a:schemeClr>
+        </a:solidFill>
+        <a:effectLst/>
+      </p:bgPr>
+    </p:bg>
     <p:spTree>
       <p:nvGrpSpPr>
         <p:cNvPr id="1" name=""/>
@@ -4608,6 +4612,2275 @@
           <a:p>
             <a:pPr algn="ctr"/>
             <a:endParaRPr lang="zh-CN" altLang="en-US"/>
+          </a:p>
+        </p:txBody>
+      </p:sp>
+      <p:pic>
+        <p:nvPicPr>
+          <p:cNvPr id="3" name="图片 2"/>
+          <p:cNvPicPr>
+            <a:picLocks noChangeAspect="1"/>
+          </p:cNvPicPr>
+          <p:nvPr/>
+        </p:nvPicPr>
+        <p:blipFill>
+          <a:blip r:embed="rId2"/>
+          <a:stretch>
+            <a:fillRect/>
+          </a:stretch>
+        </p:blipFill>
+        <p:spPr>
+          <a:xfrm>
+            <a:off x="0" y="0"/>
+            <a:ext cx="7821116" cy="581106"/>
+          </a:xfrm>
+          <a:prstGeom prst="rect">
+            <a:avLst/>
+          </a:prstGeom>
+        </p:spPr>
+      </p:pic>
+      <p:graphicFrame>
+        <p:nvGraphicFramePr>
+          <p:cNvPr id="6" name="表格 5"/>
+          <p:cNvGraphicFramePr>
+            <a:graphicFrameLocks noGrp="1"/>
+          </p:cNvGraphicFramePr>
+          <p:nvPr>
+            <p:extLst>
+              <p:ext uri="{D42A27DB-BD31-4B8C-83A1-F6EECF244321}">
+                <p14:modId xmlns:p14="http://schemas.microsoft.com/office/powerpoint/2010/main" val="4003396334"/>
+              </p:ext>
+            </p:extLst>
+          </p:nvPr>
+        </p:nvGraphicFramePr>
+        <p:xfrm>
+          <a:off x="1052947" y="1163458"/>
+          <a:ext cx="757382" cy="4450080"/>
+        </p:xfrm>
+        <a:graphic>
+          <a:graphicData uri="http://schemas.openxmlformats.org/drawingml/2006/table">
+            <a:tbl>
+              <a:tblPr firstRow="1" bandRow="1">
+                <a:tableStyleId>{5940675A-B579-460E-94D1-54222C63F5DA}</a:tableStyleId>
+              </a:tblPr>
+              <a:tblGrid>
+                <a:gridCol w="757382">
+                  <a:extLst>
+                    <a:ext uri="{9D8B030D-6E8A-4147-A177-3AD203B41FA5}">
+                      <a16:colId xmlns:a16="http://schemas.microsoft.com/office/drawing/2014/main" val="3746559037"/>
+                    </a:ext>
+                  </a:extLst>
+                </a:gridCol>
+              </a:tblGrid>
+              <a:tr h="370840">
+                <a:tc>
+                  <a:txBody>
+                    <a:bodyPr/>
+                    <a:lstStyle/>
+                    <a:p>
+                      <a:pPr algn="ctr"/>
+                      <a:r>
+                        <a:rPr lang="en-US" altLang="zh-CN" smtClean="0">
+                          <a:latin typeface="华文楷体" panose="02010600040101010101" pitchFamily="2" charset="-122"/>
+                          <a:ea typeface="华文楷体" panose="02010600040101010101" pitchFamily="2" charset="-122"/>
+                        </a:rPr>
+                        <a:t>2</a:t>
+                      </a:r>
+                      <a:endParaRPr lang="zh-CN" altLang="en-US">
+                        <a:latin typeface="华文楷体" panose="02010600040101010101" pitchFamily="2" charset="-122"/>
+                        <a:ea typeface="华文楷体" panose="02010600040101010101" pitchFamily="2" charset="-122"/>
+                      </a:endParaRPr>
+                    </a:p>
+                  </a:txBody>
+                  <a:tcPr/>
+                </a:tc>
+                <a:extLst>
+                  <a:ext uri="{0D108BD9-81ED-4DB2-BD59-A6C34878D82A}">
+                    <a16:rowId xmlns:a16="http://schemas.microsoft.com/office/drawing/2014/main" val="3903618647"/>
+                  </a:ext>
+                </a:extLst>
+              </a:tr>
+              <a:tr h="370840">
+                <a:tc>
+                  <a:txBody>
+                    <a:bodyPr/>
+                    <a:lstStyle/>
+                    <a:p>
+                      <a:pPr algn="ctr"/>
+                      <a:r>
+                        <a:rPr lang="en-US" altLang="zh-CN" smtClean="0">
+                          <a:latin typeface="华文楷体" panose="02010600040101010101" pitchFamily="2" charset="-122"/>
+                          <a:ea typeface="华文楷体" panose="02010600040101010101" pitchFamily="2" charset="-122"/>
+                        </a:rPr>
+                        <a:t>3</a:t>
+                      </a:r>
+                      <a:endParaRPr lang="zh-CN" altLang="en-US">
+                        <a:latin typeface="华文楷体" panose="02010600040101010101" pitchFamily="2" charset="-122"/>
+                        <a:ea typeface="华文楷体" panose="02010600040101010101" pitchFamily="2" charset="-122"/>
+                      </a:endParaRPr>
+                    </a:p>
+                  </a:txBody>
+                  <a:tcPr/>
+                </a:tc>
+                <a:extLst>
+                  <a:ext uri="{0D108BD9-81ED-4DB2-BD59-A6C34878D82A}">
+                    <a16:rowId xmlns:a16="http://schemas.microsoft.com/office/drawing/2014/main" val="1726911960"/>
+                  </a:ext>
+                </a:extLst>
+              </a:tr>
+              <a:tr h="370840">
+                <a:tc>
+                  <a:txBody>
+                    <a:bodyPr/>
+                    <a:lstStyle/>
+                    <a:p>
+                      <a:pPr algn="ctr"/>
+                      <a:r>
+                        <a:rPr lang="en-US" altLang="zh-CN" smtClean="0">
+                          <a:latin typeface="华文楷体" panose="02010600040101010101" pitchFamily="2" charset="-122"/>
+                          <a:ea typeface="华文楷体" panose="02010600040101010101" pitchFamily="2" charset="-122"/>
+                        </a:rPr>
+                        <a:t>1</a:t>
+                      </a:r>
+                      <a:endParaRPr lang="zh-CN" altLang="en-US">
+                        <a:latin typeface="华文楷体" panose="02010600040101010101" pitchFamily="2" charset="-122"/>
+                        <a:ea typeface="华文楷体" panose="02010600040101010101" pitchFamily="2" charset="-122"/>
+                      </a:endParaRPr>
+                    </a:p>
+                  </a:txBody>
+                  <a:tcPr/>
+                </a:tc>
+                <a:extLst>
+                  <a:ext uri="{0D108BD9-81ED-4DB2-BD59-A6C34878D82A}">
+                    <a16:rowId xmlns:a16="http://schemas.microsoft.com/office/drawing/2014/main" val="3961350793"/>
+                  </a:ext>
+                </a:extLst>
+              </a:tr>
+              <a:tr h="370840">
+                <a:tc>
+                  <a:txBody>
+                    <a:bodyPr/>
+                    <a:lstStyle/>
+                    <a:p>
+                      <a:pPr algn="ctr"/>
+                      <a:r>
+                        <a:rPr lang="en-US" altLang="zh-CN" smtClean="0">
+                          <a:latin typeface="华文楷体" panose="02010600040101010101" pitchFamily="2" charset="-122"/>
+                          <a:ea typeface="华文楷体" panose="02010600040101010101" pitchFamily="2" charset="-122"/>
+                        </a:rPr>
+                        <a:t>4</a:t>
+                      </a:r>
+                      <a:endParaRPr lang="zh-CN" altLang="en-US">
+                        <a:latin typeface="华文楷体" panose="02010600040101010101" pitchFamily="2" charset="-122"/>
+                        <a:ea typeface="华文楷体" panose="02010600040101010101" pitchFamily="2" charset="-122"/>
+                      </a:endParaRPr>
+                    </a:p>
+                  </a:txBody>
+                  <a:tcPr/>
+                </a:tc>
+                <a:extLst>
+                  <a:ext uri="{0D108BD9-81ED-4DB2-BD59-A6C34878D82A}">
+                    <a16:rowId xmlns:a16="http://schemas.microsoft.com/office/drawing/2014/main" val="2910797834"/>
+                  </a:ext>
+                </a:extLst>
+              </a:tr>
+              <a:tr h="370840">
+                <a:tc>
+                  <a:txBody>
+                    <a:bodyPr/>
+                    <a:lstStyle/>
+                    <a:p>
+                      <a:pPr algn="ctr"/>
+                      <a:endParaRPr lang="zh-CN" altLang="en-US">
+                        <a:latin typeface="华文楷体" panose="02010600040101010101" pitchFamily="2" charset="-122"/>
+                        <a:ea typeface="华文楷体" panose="02010600040101010101" pitchFamily="2" charset="-122"/>
+                      </a:endParaRPr>
+                    </a:p>
+                  </a:txBody>
+                  <a:tcPr/>
+                </a:tc>
+                <a:extLst>
+                  <a:ext uri="{0D108BD9-81ED-4DB2-BD59-A6C34878D82A}">
+                    <a16:rowId xmlns:a16="http://schemas.microsoft.com/office/drawing/2014/main" val="1120705070"/>
+                  </a:ext>
+                </a:extLst>
+              </a:tr>
+              <a:tr h="370840">
+                <a:tc>
+                  <a:txBody>
+                    <a:bodyPr/>
+                    <a:lstStyle/>
+                    <a:p>
+                      <a:pPr algn="ctr"/>
+                      <a:endParaRPr lang="zh-CN" altLang="en-US">
+                        <a:latin typeface="华文楷体" panose="02010600040101010101" pitchFamily="2" charset="-122"/>
+                        <a:ea typeface="华文楷体" panose="02010600040101010101" pitchFamily="2" charset="-122"/>
+                      </a:endParaRPr>
+                    </a:p>
+                  </a:txBody>
+                  <a:tcPr/>
+                </a:tc>
+                <a:extLst>
+                  <a:ext uri="{0D108BD9-81ED-4DB2-BD59-A6C34878D82A}">
+                    <a16:rowId xmlns:a16="http://schemas.microsoft.com/office/drawing/2014/main" val="1708795315"/>
+                  </a:ext>
+                </a:extLst>
+              </a:tr>
+              <a:tr h="370840">
+                <a:tc>
+                  <a:txBody>
+                    <a:bodyPr/>
+                    <a:lstStyle/>
+                    <a:p>
+                      <a:pPr algn="ctr"/>
+                      <a:endParaRPr lang="zh-CN" altLang="en-US">
+                        <a:latin typeface="华文楷体" panose="02010600040101010101" pitchFamily="2" charset="-122"/>
+                        <a:ea typeface="华文楷体" panose="02010600040101010101" pitchFamily="2" charset="-122"/>
+                      </a:endParaRPr>
+                    </a:p>
+                  </a:txBody>
+                  <a:tcPr/>
+                </a:tc>
+                <a:extLst>
+                  <a:ext uri="{0D108BD9-81ED-4DB2-BD59-A6C34878D82A}">
+                    <a16:rowId xmlns:a16="http://schemas.microsoft.com/office/drawing/2014/main" val="1476398056"/>
+                  </a:ext>
+                </a:extLst>
+              </a:tr>
+              <a:tr h="370840">
+                <a:tc>
+                  <a:txBody>
+                    <a:bodyPr/>
+                    <a:lstStyle/>
+                    <a:p>
+                      <a:pPr algn="ctr"/>
+                      <a:endParaRPr lang="zh-CN" altLang="en-US">
+                        <a:latin typeface="华文楷体" panose="02010600040101010101" pitchFamily="2" charset="-122"/>
+                        <a:ea typeface="华文楷体" panose="02010600040101010101" pitchFamily="2" charset="-122"/>
+                      </a:endParaRPr>
+                    </a:p>
+                  </a:txBody>
+                  <a:tcPr/>
+                </a:tc>
+                <a:extLst>
+                  <a:ext uri="{0D108BD9-81ED-4DB2-BD59-A6C34878D82A}">
+                    <a16:rowId xmlns:a16="http://schemas.microsoft.com/office/drawing/2014/main" val="3278924676"/>
+                  </a:ext>
+                </a:extLst>
+              </a:tr>
+              <a:tr h="370840">
+                <a:tc>
+                  <a:txBody>
+                    <a:bodyPr/>
+                    <a:lstStyle/>
+                    <a:p>
+                      <a:pPr algn="ctr"/>
+                      <a:endParaRPr lang="zh-CN" altLang="en-US">
+                        <a:latin typeface="华文楷体" panose="02010600040101010101" pitchFamily="2" charset="-122"/>
+                        <a:ea typeface="华文楷体" panose="02010600040101010101" pitchFamily="2" charset="-122"/>
+                      </a:endParaRPr>
+                    </a:p>
+                  </a:txBody>
+                  <a:tcPr/>
+                </a:tc>
+                <a:extLst>
+                  <a:ext uri="{0D108BD9-81ED-4DB2-BD59-A6C34878D82A}">
+                    <a16:rowId xmlns:a16="http://schemas.microsoft.com/office/drawing/2014/main" val="47775284"/>
+                  </a:ext>
+                </a:extLst>
+              </a:tr>
+              <a:tr h="370840">
+                <a:tc>
+                  <a:txBody>
+                    <a:bodyPr/>
+                    <a:lstStyle/>
+                    <a:p>
+                      <a:pPr algn="ctr"/>
+                      <a:endParaRPr lang="zh-CN" altLang="en-US">
+                        <a:latin typeface="华文楷体" panose="02010600040101010101" pitchFamily="2" charset="-122"/>
+                        <a:ea typeface="华文楷体" panose="02010600040101010101" pitchFamily="2" charset="-122"/>
+                      </a:endParaRPr>
+                    </a:p>
+                  </a:txBody>
+                  <a:tcPr/>
+                </a:tc>
+                <a:extLst>
+                  <a:ext uri="{0D108BD9-81ED-4DB2-BD59-A6C34878D82A}">
+                    <a16:rowId xmlns:a16="http://schemas.microsoft.com/office/drawing/2014/main" val="1863691879"/>
+                  </a:ext>
+                </a:extLst>
+              </a:tr>
+              <a:tr h="370840">
+                <a:tc>
+                  <a:txBody>
+                    <a:bodyPr/>
+                    <a:lstStyle/>
+                    <a:p>
+                      <a:pPr algn="ctr"/>
+                      <a:endParaRPr lang="zh-CN" altLang="en-US">
+                        <a:latin typeface="华文楷体" panose="02010600040101010101" pitchFamily="2" charset="-122"/>
+                        <a:ea typeface="华文楷体" panose="02010600040101010101" pitchFamily="2" charset="-122"/>
+                      </a:endParaRPr>
+                    </a:p>
+                  </a:txBody>
+                  <a:tcPr/>
+                </a:tc>
+                <a:extLst>
+                  <a:ext uri="{0D108BD9-81ED-4DB2-BD59-A6C34878D82A}">
+                    <a16:rowId xmlns:a16="http://schemas.microsoft.com/office/drawing/2014/main" val="2089793478"/>
+                  </a:ext>
+                </a:extLst>
+              </a:tr>
+              <a:tr h="370840">
+                <a:tc>
+                  <a:txBody>
+                    <a:bodyPr/>
+                    <a:lstStyle/>
+                    <a:p>
+                      <a:pPr algn="ctr"/>
+                      <a:endParaRPr lang="zh-CN" altLang="en-US">
+                        <a:latin typeface="华文楷体" panose="02010600040101010101" pitchFamily="2" charset="-122"/>
+                        <a:ea typeface="华文楷体" panose="02010600040101010101" pitchFamily="2" charset="-122"/>
+                      </a:endParaRPr>
+                    </a:p>
+                  </a:txBody>
+                  <a:tcPr/>
+                </a:tc>
+                <a:extLst>
+                  <a:ext uri="{0D108BD9-81ED-4DB2-BD59-A6C34878D82A}">
+                    <a16:rowId xmlns:a16="http://schemas.microsoft.com/office/drawing/2014/main" val="431183443"/>
+                  </a:ext>
+                </a:extLst>
+              </a:tr>
+            </a:tbl>
+          </a:graphicData>
+        </a:graphic>
+      </p:graphicFrame>
+      <p:graphicFrame>
+        <p:nvGraphicFramePr>
+          <p:cNvPr id="7" name="表格 6"/>
+          <p:cNvGraphicFramePr>
+            <a:graphicFrameLocks noGrp="1"/>
+          </p:cNvGraphicFramePr>
+          <p:nvPr>
+            <p:extLst>
+              <p:ext uri="{D42A27DB-BD31-4B8C-83A1-F6EECF244321}">
+                <p14:modId xmlns:p14="http://schemas.microsoft.com/office/powerpoint/2010/main" val="1803572984"/>
+              </p:ext>
+            </p:extLst>
+          </p:nvPr>
+        </p:nvGraphicFramePr>
+        <p:xfrm>
+          <a:off x="3620655" y="1163458"/>
+          <a:ext cx="4627416" cy="4450080"/>
+        </p:xfrm>
+        <a:graphic>
+          <a:graphicData uri="http://schemas.openxmlformats.org/drawingml/2006/table">
+            <a:tbl>
+              <a:tblPr firstRow="1" bandRow="1">
+                <a:tableStyleId>{5940675A-B579-460E-94D1-54222C63F5DA}</a:tableStyleId>
+              </a:tblPr>
+              <a:tblGrid>
+                <a:gridCol w="771236">
+                  <a:extLst>
+                    <a:ext uri="{9D8B030D-6E8A-4147-A177-3AD203B41FA5}">
+                      <a16:colId xmlns:a16="http://schemas.microsoft.com/office/drawing/2014/main" val="2881180918"/>
+                    </a:ext>
+                  </a:extLst>
+                </a:gridCol>
+                <a:gridCol w="771236">
+                  <a:extLst>
+                    <a:ext uri="{9D8B030D-6E8A-4147-A177-3AD203B41FA5}">
+                      <a16:colId xmlns:a16="http://schemas.microsoft.com/office/drawing/2014/main" val="3875631772"/>
+                    </a:ext>
+                  </a:extLst>
+                </a:gridCol>
+                <a:gridCol w="771236">
+                  <a:extLst>
+                    <a:ext uri="{9D8B030D-6E8A-4147-A177-3AD203B41FA5}">
+                      <a16:colId xmlns:a16="http://schemas.microsoft.com/office/drawing/2014/main" val="4288339980"/>
+                    </a:ext>
+                  </a:extLst>
+                </a:gridCol>
+                <a:gridCol w="771236">
+                  <a:extLst>
+                    <a:ext uri="{9D8B030D-6E8A-4147-A177-3AD203B41FA5}">
+                      <a16:colId xmlns:a16="http://schemas.microsoft.com/office/drawing/2014/main" val="1288520464"/>
+                    </a:ext>
+                  </a:extLst>
+                </a:gridCol>
+                <a:gridCol w="771236">
+                  <a:extLst>
+                    <a:ext uri="{9D8B030D-6E8A-4147-A177-3AD203B41FA5}">
+                      <a16:colId xmlns:a16="http://schemas.microsoft.com/office/drawing/2014/main" val="2858607525"/>
+                    </a:ext>
+                  </a:extLst>
+                </a:gridCol>
+                <a:gridCol w="771236">
+                  <a:extLst>
+                    <a:ext uri="{9D8B030D-6E8A-4147-A177-3AD203B41FA5}">
+                      <a16:colId xmlns:a16="http://schemas.microsoft.com/office/drawing/2014/main" val="3832119623"/>
+                    </a:ext>
+                  </a:extLst>
+                </a:gridCol>
+              </a:tblGrid>
+              <a:tr h="370840">
+                <a:tc>
+                  <a:txBody>
+                    <a:bodyPr/>
+                    <a:lstStyle/>
+                    <a:p>
+                      <a:pPr algn="ctr"/>
+                      <a:r>
+                        <a:rPr lang="en-US" altLang="zh-CN" smtClean="0">
+                          <a:latin typeface="华文楷体" panose="02010600040101010101" pitchFamily="2" charset="-122"/>
+                          <a:ea typeface="华文楷体" panose="02010600040101010101" pitchFamily="2" charset="-122"/>
+                        </a:rPr>
+                        <a:t>0</a:t>
+                      </a:r>
+                      <a:endParaRPr lang="zh-CN" altLang="en-US">
+                        <a:latin typeface="华文楷体" panose="02010600040101010101" pitchFamily="2" charset="-122"/>
+                        <a:ea typeface="华文楷体" panose="02010600040101010101" pitchFamily="2" charset="-122"/>
+                      </a:endParaRPr>
+                    </a:p>
+                  </a:txBody>
+                  <a:tcPr/>
+                </a:tc>
+                <a:tc>
+                  <a:txBody>
+                    <a:bodyPr/>
+                    <a:lstStyle/>
+                    <a:p>
+                      <a:pPr algn="ctr"/>
+                      <a:r>
+                        <a:rPr lang="en-US" altLang="zh-CN" smtClean="0">
+                          <a:latin typeface="华文楷体" panose="02010600040101010101" pitchFamily="2" charset="-122"/>
+                          <a:ea typeface="华文楷体" panose="02010600040101010101" pitchFamily="2" charset="-122"/>
+                        </a:rPr>
+                        <a:t>1</a:t>
+                      </a:r>
+                      <a:endParaRPr lang="zh-CN" altLang="en-US">
+                        <a:latin typeface="华文楷体" panose="02010600040101010101" pitchFamily="2" charset="-122"/>
+                        <a:ea typeface="华文楷体" panose="02010600040101010101" pitchFamily="2" charset="-122"/>
+                      </a:endParaRPr>
+                    </a:p>
+                  </a:txBody>
+                  <a:tcPr/>
+                </a:tc>
+                <a:tc>
+                  <a:txBody>
+                    <a:bodyPr/>
+                    <a:lstStyle/>
+                    <a:p>
+                      <a:pPr algn="ctr"/>
+                      <a:r>
+                        <a:rPr lang="en-US" altLang="zh-CN" smtClean="0">
+                          <a:latin typeface="华文楷体" panose="02010600040101010101" pitchFamily="2" charset="-122"/>
+                          <a:ea typeface="华文楷体" panose="02010600040101010101" pitchFamily="2" charset="-122"/>
+                        </a:rPr>
+                        <a:t>1</a:t>
+                      </a:r>
+                      <a:endParaRPr lang="zh-CN" altLang="en-US">
+                        <a:latin typeface="华文楷体" panose="02010600040101010101" pitchFamily="2" charset="-122"/>
+                        <a:ea typeface="华文楷体" panose="02010600040101010101" pitchFamily="2" charset="-122"/>
+                      </a:endParaRPr>
+                    </a:p>
+                  </a:txBody>
+                  <a:tcPr/>
+                </a:tc>
+                <a:tc>
+                  <a:txBody>
+                    <a:bodyPr/>
+                    <a:lstStyle/>
+                    <a:p>
+                      <a:pPr algn="ctr"/>
+                      <a:r>
+                        <a:rPr lang="en-US" altLang="zh-CN" smtClean="0">
+                          <a:latin typeface="华文楷体" panose="02010600040101010101" pitchFamily="2" charset="-122"/>
+                          <a:ea typeface="华文楷体" panose="02010600040101010101" pitchFamily="2" charset="-122"/>
+                        </a:rPr>
+                        <a:t>0</a:t>
+                      </a:r>
+                      <a:endParaRPr lang="zh-CN" altLang="en-US">
+                        <a:latin typeface="华文楷体" panose="02010600040101010101" pitchFamily="2" charset="-122"/>
+                        <a:ea typeface="华文楷体" panose="02010600040101010101" pitchFamily="2" charset="-122"/>
+                      </a:endParaRPr>
+                    </a:p>
+                  </a:txBody>
+                  <a:tcPr/>
+                </a:tc>
+                <a:tc>
+                  <a:txBody>
+                    <a:bodyPr/>
+                    <a:lstStyle/>
+                    <a:p>
+                      <a:pPr algn="ctr"/>
+                      <a:r>
+                        <a:rPr lang="en-US" altLang="zh-CN" smtClean="0">
+                          <a:latin typeface="华文楷体" panose="02010600040101010101" pitchFamily="2" charset="-122"/>
+                          <a:ea typeface="华文楷体" panose="02010600040101010101" pitchFamily="2" charset="-122"/>
+                        </a:rPr>
+                        <a:t>0</a:t>
+                      </a:r>
+                      <a:endParaRPr lang="zh-CN" altLang="en-US">
+                        <a:latin typeface="华文楷体" panose="02010600040101010101" pitchFamily="2" charset="-122"/>
+                        <a:ea typeface="华文楷体" panose="02010600040101010101" pitchFamily="2" charset="-122"/>
+                      </a:endParaRPr>
+                    </a:p>
+                  </a:txBody>
+                  <a:tcPr/>
+                </a:tc>
+                <a:tc>
+                  <a:txBody>
+                    <a:bodyPr/>
+                    <a:lstStyle/>
+                    <a:p>
+                      <a:pPr algn="ctr"/>
+                      <a:r>
+                        <a:rPr lang="en-US" altLang="zh-CN" smtClean="0">
+                          <a:latin typeface="华文楷体" panose="02010600040101010101" pitchFamily="2" charset="-122"/>
+                          <a:ea typeface="华文楷体" panose="02010600040101010101" pitchFamily="2" charset="-122"/>
+                        </a:rPr>
+                        <a:t>0</a:t>
+                      </a:r>
+                      <a:endParaRPr lang="zh-CN" altLang="en-US">
+                        <a:latin typeface="华文楷体" panose="02010600040101010101" pitchFamily="2" charset="-122"/>
+                        <a:ea typeface="华文楷体" panose="02010600040101010101" pitchFamily="2" charset="-122"/>
+                      </a:endParaRPr>
+                    </a:p>
+                  </a:txBody>
+                  <a:tcPr/>
+                </a:tc>
+                <a:extLst>
+                  <a:ext uri="{0D108BD9-81ED-4DB2-BD59-A6C34878D82A}">
+                    <a16:rowId xmlns:a16="http://schemas.microsoft.com/office/drawing/2014/main" val="2933912569"/>
+                  </a:ext>
+                </a:extLst>
+              </a:tr>
+              <a:tr h="370840">
+                <a:tc>
+                  <a:txBody>
+                    <a:bodyPr/>
+                    <a:lstStyle/>
+                    <a:p>
+                      <a:pPr algn="ctr"/>
+                      <a:r>
+                        <a:rPr lang="en-US" altLang="zh-CN" smtClean="0">
+                          <a:latin typeface="华文楷体" panose="02010600040101010101" pitchFamily="2" charset="-122"/>
+                          <a:ea typeface="华文楷体" panose="02010600040101010101" pitchFamily="2" charset="-122"/>
+                        </a:rPr>
+                        <a:t>1</a:t>
+                      </a:r>
+                      <a:endParaRPr lang="zh-CN" altLang="en-US">
+                        <a:latin typeface="华文楷体" panose="02010600040101010101" pitchFamily="2" charset="-122"/>
+                        <a:ea typeface="华文楷体" panose="02010600040101010101" pitchFamily="2" charset="-122"/>
+                      </a:endParaRPr>
+                    </a:p>
+                  </a:txBody>
+                  <a:tcPr/>
+                </a:tc>
+                <a:tc>
+                  <a:txBody>
+                    <a:bodyPr/>
+                    <a:lstStyle/>
+                    <a:p>
+                      <a:pPr algn="ctr"/>
+                      <a:r>
+                        <a:rPr lang="en-US" altLang="zh-CN" smtClean="0">
+                          <a:latin typeface="华文楷体" panose="02010600040101010101" pitchFamily="2" charset="-122"/>
+                          <a:ea typeface="华文楷体" panose="02010600040101010101" pitchFamily="2" charset="-122"/>
+                        </a:rPr>
+                        <a:t>1</a:t>
+                      </a:r>
+                      <a:endParaRPr lang="zh-CN" altLang="en-US">
+                        <a:latin typeface="华文楷体" panose="02010600040101010101" pitchFamily="2" charset="-122"/>
+                        <a:ea typeface="华文楷体" panose="02010600040101010101" pitchFamily="2" charset="-122"/>
+                      </a:endParaRPr>
+                    </a:p>
+                  </a:txBody>
+                  <a:tcPr/>
+                </a:tc>
+                <a:tc>
+                  <a:txBody>
+                    <a:bodyPr/>
+                    <a:lstStyle/>
+                    <a:p>
+                      <a:pPr algn="ctr"/>
+                      <a:r>
+                        <a:rPr lang="en-US" altLang="zh-CN" smtClean="0">
+                          <a:latin typeface="华文楷体" panose="02010600040101010101" pitchFamily="2" charset="-122"/>
+                          <a:ea typeface="华文楷体" panose="02010600040101010101" pitchFamily="2" charset="-122"/>
+                        </a:rPr>
+                        <a:t>1</a:t>
+                      </a:r>
+                      <a:endParaRPr lang="zh-CN" altLang="en-US">
+                        <a:latin typeface="华文楷体" panose="02010600040101010101" pitchFamily="2" charset="-122"/>
+                        <a:ea typeface="华文楷体" panose="02010600040101010101" pitchFamily="2" charset="-122"/>
+                      </a:endParaRPr>
+                    </a:p>
+                  </a:txBody>
+                  <a:tcPr/>
+                </a:tc>
+                <a:tc>
+                  <a:txBody>
+                    <a:bodyPr/>
+                    <a:lstStyle/>
+                    <a:p>
+                      <a:pPr algn="ctr"/>
+                      <a:r>
+                        <a:rPr lang="en-US" altLang="zh-CN" smtClean="0">
+                          <a:latin typeface="华文楷体" panose="02010600040101010101" pitchFamily="2" charset="-122"/>
+                          <a:ea typeface="华文楷体" panose="02010600040101010101" pitchFamily="2" charset="-122"/>
+                        </a:rPr>
+                        <a:t>0</a:t>
+                      </a:r>
+                      <a:endParaRPr lang="zh-CN" altLang="en-US">
+                        <a:latin typeface="华文楷体" panose="02010600040101010101" pitchFamily="2" charset="-122"/>
+                        <a:ea typeface="华文楷体" panose="02010600040101010101" pitchFamily="2" charset="-122"/>
+                      </a:endParaRPr>
+                    </a:p>
+                  </a:txBody>
+                  <a:tcPr/>
+                </a:tc>
+                <a:tc>
+                  <a:txBody>
+                    <a:bodyPr/>
+                    <a:lstStyle/>
+                    <a:p>
+                      <a:pPr algn="ctr"/>
+                      <a:r>
+                        <a:rPr lang="en-US" altLang="zh-CN" smtClean="0">
+                          <a:latin typeface="华文楷体" panose="02010600040101010101" pitchFamily="2" charset="-122"/>
+                          <a:ea typeface="华文楷体" panose="02010600040101010101" pitchFamily="2" charset="-122"/>
+                        </a:rPr>
+                        <a:t>1</a:t>
+                      </a:r>
+                      <a:endParaRPr lang="zh-CN" altLang="en-US">
+                        <a:latin typeface="华文楷体" panose="02010600040101010101" pitchFamily="2" charset="-122"/>
+                        <a:ea typeface="华文楷体" panose="02010600040101010101" pitchFamily="2" charset="-122"/>
+                      </a:endParaRPr>
+                    </a:p>
+                  </a:txBody>
+                  <a:tcPr/>
+                </a:tc>
+                <a:tc>
+                  <a:txBody>
+                    <a:bodyPr/>
+                    <a:lstStyle/>
+                    <a:p>
+                      <a:pPr algn="ctr"/>
+                      <a:r>
+                        <a:rPr lang="en-US" altLang="zh-CN" smtClean="0">
+                          <a:latin typeface="华文楷体" panose="02010600040101010101" pitchFamily="2" charset="-122"/>
+                          <a:ea typeface="华文楷体" panose="02010600040101010101" pitchFamily="2" charset="-122"/>
+                        </a:rPr>
+                        <a:t>0</a:t>
+                      </a:r>
+                      <a:endParaRPr lang="zh-CN" altLang="en-US">
+                        <a:latin typeface="华文楷体" panose="02010600040101010101" pitchFamily="2" charset="-122"/>
+                        <a:ea typeface="华文楷体" panose="02010600040101010101" pitchFamily="2" charset="-122"/>
+                      </a:endParaRPr>
+                    </a:p>
+                  </a:txBody>
+                  <a:tcPr/>
+                </a:tc>
+                <a:extLst>
+                  <a:ext uri="{0D108BD9-81ED-4DB2-BD59-A6C34878D82A}">
+                    <a16:rowId xmlns:a16="http://schemas.microsoft.com/office/drawing/2014/main" val="1431821358"/>
+                  </a:ext>
+                </a:extLst>
+              </a:tr>
+              <a:tr h="370840">
+                <a:tc>
+                  <a:txBody>
+                    <a:bodyPr/>
+                    <a:lstStyle/>
+                    <a:p>
+                      <a:pPr algn="ctr"/>
+                      <a:r>
+                        <a:rPr lang="en-US" altLang="zh-CN" smtClean="0">
+                          <a:latin typeface="华文楷体" panose="02010600040101010101" pitchFamily="2" charset="-122"/>
+                          <a:ea typeface="华文楷体" panose="02010600040101010101" pitchFamily="2" charset="-122"/>
+                        </a:rPr>
+                        <a:t>0</a:t>
+                      </a:r>
+                      <a:endParaRPr lang="zh-CN" altLang="en-US">
+                        <a:latin typeface="华文楷体" panose="02010600040101010101" pitchFamily="2" charset="-122"/>
+                        <a:ea typeface="华文楷体" panose="02010600040101010101" pitchFamily="2" charset="-122"/>
+                      </a:endParaRPr>
+                    </a:p>
+                  </a:txBody>
+                  <a:tcPr/>
+                </a:tc>
+                <a:tc>
+                  <a:txBody>
+                    <a:bodyPr/>
+                    <a:lstStyle/>
+                    <a:p>
+                      <a:pPr algn="ctr"/>
+                      <a:r>
+                        <a:rPr lang="en-US" altLang="zh-CN" smtClean="0">
+                          <a:latin typeface="华文楷体" panose="02010600040101010101" pitchFamily="2" charset="-122"/>
+                          <a:ea typeface="华文楷体" panose="02010600040101010101" pitchFamily="2" charset="-122"/>
+                        </a:rPr>
+                        <a:t>1</a:t>
+                      </a:r>
+                      <a:endParaRPr lang="zh-CN" altLang="en-US">
+                        <a:latin typeface="华文楷体" panose="02010600040101010101" pitchFamily="2" charset="-122"/>
+                        <a:ea typeface="华文楷体" panose="02010600040101010101" pitchFamily="2" charset="-122"/>
+                      </a:endParaRPr>
+                    </a:p>
+                  </a:txBody>
+                  <a:tcPr/>
+                </a:tc>
+                <a:tc>
+                  <a:txBody>
+                    <a:bodyPr/>
+                    <a:lstStyle/>
+                    <a:p>
+                      <a:pPr algn="ctr"/>
+                      <a:r>
+                        <a:rPr lang="en-US" altLang="zh-CN" smtClean="0">
+                          <a:latin typeface="华文楷体" panose="02010600040101010101" pitchFamily="2" charset="-122"/>
+                          <a:ea typeface="华文楷体" panose="02010600040101010101" pitchFamily="2" charset="-122"/>
+                        </a:rPr>
+                        <a:t>0</a:t>
+                      </a:r>
+                      <a:endParaRPr lang="zh-CN" altLang="en-US">
+                        <a:latin typeface="华文楷体" panose="02010600040101010101" pitchFamily="2" charset="-122"/>
+                        <a:ea typeface="华文楷体" panose="02010600040101010101" pitchFamily="2" charset="-122"/>
+                      </a:endParaRPr>
+                    </a:p>
+                  </a:txBody>
+                  <a:tcPr/>
+                </a:tc>
+                <a:tc>
+                  <a:txBody>
+                    <a:bodyPr/>
+                    <a:lstStyle/>
+                    <a:p>
+                      <a:pPr algn="ctr"/>
+                      <a:r>
+                        <a:rPr lang="en-US" altLang="zh-CN" smtClean="0">
+                          <a:latin typeface="华文楷体" panose="02010600040101010101" pitchFamily="2" charset="-122"/>
+                          <a:ea typeface="华文楷体" panose="02010600040101010101" pitchFamily="2" charset="-122"/>
+                        </a:rPr>
+                        <a:t>1</a:t>
+                      </a:r>
+                      <a:endParaRPr lang="zh-CN" altLang="en-US">
+                        <a:latin typeface="华文楷体" panose="02010600040101010101" pitchFamily="2" charset="-122"/>
+                        <a:ea typeface="华文楷体" panose="02010600040101010101" pitchFamily="2" charset="-122"/>
+                      </a:endParaRPr>
+                    </a:p>
+                  </a:txBody>
+                  <a:tcPr/>
+                </a:tc>
+                <a:tc>
+                  <a:txBody>
+                    <a:bodyPr/>
+                    <a:lstStyle/>
+                    <a:p>
+                      <a:pPr algn="ctr"/>
+                      <a:r>
+                        <a:rPr lang="en-US" altLang="zh-CN" smtClean="0">
+                          <a:latin typeface="华文楷体" panose="02010600040101010101" pitchFamily="2" charset="-122"/>
+                          <a:ea typeface="华文楷体" panose="02010600040101010101" pitchFamily="2" charset="-122"/>
+                        </a:rPr>
+                        <a:t>0</a:t>
+                      </a:r>
+                      <a:endParaRPr lang="zh-CN" altLang="en-US">
+                        <a:latin typeface="华文楷体" panose="02010600040101010101" pitchFamily="2" charset="-122"/>
+                        <a:ea typeface="华文楷体" panose="02010600040101010101" pitchFamily="2" charset="-122"/>
+                      </a:endParaRPr>
+                    </a:p>
+                  </a:txBody>
+                  <a:tcPr/>
+                </a:tc>
+                <a:tc>
+                  <a:txBody>
+                    <a:bodyPr/>
+                    <a:lstStyle/>
+                    <a:p>
+                      <a:pPr algn="ctr"/>
+                      <a:r>
+                        <a:rPr lang="en-US" altLang="zh-CN" smtClean="0">
+                          <a:latin typeface="华文楷体" panose="02010600040101010101" pitchFamily="2" charset="-122"/>
+                          <a:ea typeface="华文楷体" panose="02010600040101010101" pitchFamily="2" charset="-122"/>
+                        </a:rPr>
+                        <a:t>1</a:t>
+                      </a:r>
+                      <a:endParaRPr lang="zh-CN" altLang="en-US">
+                        <a:latin typeface="华文楷体" panose="02010600040101010101" pitchFamily="2" charset="-122"/>
+                        <a:ea typeface="华文楷体" panose="02010600040101010101" pitchFamily="2" charset="-122"/>
+                      </a:endParaRPr>
+                    </a:p>
+                  </a:txBody>
+                  <a:tcPr/>
+                </a:tc>
+                <a:extLst>
+                  <a:ext uri="{0D108BD9-81ED-4DB2-BD59-A6C34878D82A}">
+                    <a16:rowId xmlns:a16="http://schemas.microsoft.com/office/drawing/2014/main" val="2970958984"/>
+                  </a:ext>
+                </a:extLst>
+              </a:tr>
+              <a:tr h="370840">
+                <a:tc>
+                  <a:txBody>
+                    <a:bodyPr/>
+                    <a:lstStyle/>
+                    <a:p>
+                      <a:pPr algn="ctr"/>
+                      <a:r>
+                        <a:rPr lang="en-US" altLang="zh-CN" smtClean="0">
+                          <a:latin typeface="华文楷体" panose="02010600040101010101" pitchFamily="2" charset="-122"/>
+                          <a:ea typeface="华文楷体" panose="02010600040101010101" pitchFamily="2" charset="-122"/>
+                        </a:rPr>
+                        <a:t>0</a:t>
+                      </a:r>
+                      <a:endParaRPr lang="zh-CN" altLang="en-US">
+                        <a:latin typeface="华文楷体" panose="02010600040101010101" pitchFamily="2" charset="-122"/>
+                        <a:ea typeface="华文楷体" panose="02010600040101010101" pitchFamily="2" charset="-122"/>
+                      </a:endParaRPr>
+                    </a:p>
+                  </a:txBody>
+                  <a:tcPr/>
+                </a:tc>
+                <a:tc>
+                  <a:txBody>
+                    <a:bodyPr/>
+                    <a:lstStyle/>
+                    <a:p>
+                      <a:pPr algn="ctr"/>
+                      <a:r>
+                        <a:rPr lang="en-US" altLang="zh-CN" smtClean="0">
+                          <a:latin typeface="华文楷体" panose="02010600040101010101" pitchFamily="2" charset="-122"/>
+                          <a:ea typeface="华文楷体" panose="02010600040101010101" pitchFamily="2" charset="-122"/>
+                        </a:rPr>
+                        <a:t>0</a:t>
+                      </a:r>
+                      <a:endParaRPr lang="zh-CN" altLang="en-US">
+                        <a:latin typeface="华文楷体" panose="02010600040101010101" pitchFamily="2" charset="-122"/>
+                        <a:ea typeface="华文楷体" panose="02010600040101010101" pitchFamily="2" charset="-122"/>
+                      </a:endParaRPr>
+                    </a:p>
+                  </a:txBody>
+                  <a:tcPr/>
+                </a:tc>
+                <a:tc>
+                  <a:txBody>
+                    <a:bodyPr/>
+                    <a:lstStyle/>
+                    <a:p>
+                      <a:pPr algn="ctr"/>
+                      <a:r>
+                        <a:rPr lang="en-US" altLang="zh-CN" smtClean="0">
+                          <a:latin typeface="华文楷体" panose="02010600040101010101" pitchFamily="2" charset="-122"/>
+                          <a:ea typeface="华文楷体" panose="02010600040101010101" pitchFamily="2" charset="-122"/>
+                        </a:rPr>
+                        <a:t>1</a:t>
+                      </a:r>
+                      <a:endParaRPr lang="zh-CN" altLang="en-US">
+                        <a:latin typeface="华文楷体" panose="02010600040101010101" pitchFamily="2" charset="-122"/>
+                        <a:ea typeface="华文楷体" panose="02010600040101010101" pitchFamily="2" charset="-122"/>
+                      </a:endParaRPr>
+                    </a:p>
+                  </a:txBody>
+                  <a:tcPr/>
+                </a:tc>
+                <a:tc>
+                  <a:txBody>
+                    <a:bodyPr/>
+                    <a:lstStyle/>
+                    <a:p>
+                      <a:pPr algn="ctr"/>
+                      <a:r>
+                        <a:rPr lang="en-US" altLang="zh-CN" smtClean="0">
+                          <a:latin typeface="华文楷体" panose="02010600040101010101" pitchFamily="2" charset="-122"/>
+                          <a:ea typeface="华文楷体" panose="02010600040101010101" pitchFamily="2" charset="-122"/>
+                        </a:rPr>
+                        <a:t>1</a:t>
+                      </a:r>
+                      <a:endParaRPr lang="zh-CN" altLang="en-US">
+                        <a:latin typeface="华文楷体" panose="02010600040101010101" pitchFamily="2" charset="-122"/>
+                        <a:ea typeface="华文楷体" panose="02010600040101010101" pitchFamily="2" charset="-122"/>
+                      </a:endParaRPr>
+                    </a:p>
+                  </a:txBody>
+                  <a:tcPr/>
+                </a:tc>
+                <a:tc>
+                  <a:txBody>
+                    <a:bodyPr/>
+                    <a:lstStyle/>
+                    <a:p>
+                      <a:pPr algn="ctr"/>
+                      <a:r>
+                        <a:rPr lang="en-US" altLang="zh-CN" smtClean="0">
+                          <a:latin typeface="华文楷体" panose="02010600040101010101" pitchFamily="2" charset="-122"/>
+                          <a:ea typeface="华文楷体" panose="02010600040101010101" pitchFamily="2" charset="-122"/>
+                        </a:rPr>
+                        <a:t>0</a:t>
+                      </a:r>
+                      <a:endParaRPr lang="zh-CN" altLang="en-US">
+                        <a:latin typeface="华文楷体" panose="02010600040101010101" pitchFamily="2" charset="-122"/>
+                        <a:ea typeface="华文楷体" panose="02010600040101010101" pitchFamily="2" charset="-122"/>
+                      </a:endParaRPr>
+                    </a:p>
+                  </a:txBody>
+                  <a:tcPr/>
+                </a:tc>
+                <a:tc>
+                  <a:txBody>
+                    <a:bodyPr/>
+                    <a:lstStyle/>
+                    <a:p>
+                      <a:pPr algn="ctr"/>
+                      <a:r>
+                        <a:rPr lang="en-US" altLang="zh-CN" smtClean="0">
+                          <a:latin typeface="华文楷体" panose="02010600040101010101" pitchFamily="2" charset="-122"/>
+                          <a:ea typeface="华文楷体" panose="02010600040101010101" pitchFamily="2" charset="-122"/>
+                        </a:rPr>
+                        <a:t>1</a:t>
+                      </a:r>
+                      <a:endParaRPr lang="zh-CN" altLang="en-US">
+                        <a:latin typeface="华文楷体" panose="02010600040101010101" pitchFamily="2" charset="-122"/>
+                        <a:ea typeface="华文楷体" panose="02010600040101010101" pitchFamily="2" charset="-122"/>
+                      </a:endParaRPr>
+                    </a:p>
+                  </a:txBody>
+                  <a:tcPr/>
+                </a:tc>
+                <a:extLst>
+                  <a:ext uri="{0D108BD9-81ED-4DB2-BD59-A6C34878D82A}">
+                    <a16:rowId xmlns:a16="http://schemas.microsoft.com/office/drawing/2014/main" val="834972429"/>
+                  </a:ext>
+                </a:extLst>
+              </a:tr>
+              <a:tr h="370840">
+                <a:tc>
+                  <a:txBody>
+                    <a:bodyPr/>
+                    <a:lstStyle/>
+                    <a:p>
+                      <a:pPr algn="ctr"/>
+                      <a:endParaRPr lang="zh-CN" altLang="en-US">
+                        <a:latin typeface="华文楷体" panose="02010600040101010101" pitchFamily="2" charset="-122"/>
+                        <a:ea typeface="华文楷体" panose="02010600040101010101" pitchFamily="2" charset="-122"/>
+                      </a:endParaRPr>
+                    </a:p>
+                  </a:txBody>
+                  <a:tcPr/>
+                </a:tc>
+                <a:tc>
+                  <a:txBody>
+                    <a:bodyPr/>
+                    <a:lstStyle/>
+                    <a:p>
+                      <a:pPr algn="ctr"/>
+                      <a:endParaRPr lang="zh-CN" altLang="en-US">
+                        <a:latin typeface="华文楷体" panose="02010600040101010101" pitchFamily="2" charset="-122"/>
+                        <a:ea typeface="华文楷体" panose="02010600040101010101" pitchFamily="2" charset="-122"/>
+                      </a:endParaRPr>
+                    </a:p>
+                  </a:txBody>
+                  <a:tcPr/>
+                </a:tc>
+                <a:tc>
+                  <a:txBody>
+                    <a:bodyPr/>
+                    <a:lstStyle/>
+                    <a:p>
+                      <a:pPr algn="ctr"/>
+                      <a:endParaRPr lang="zh-CN" altLang="en-US">
+                        <a:latin typeface="华文楷体" panose="02010600040101010101" pitchFamily="2" charset="-122"/>
+                        <a:ea typeface="华文楷体" panose="02010600040101010101" pitchFamily="2" charset="-122"/>
+                      </a:endParaRPr>
+                    </a:p>
+                  </a:txBody>
+                  <a:tcPr/>
+                </a:tc>
+                <a:tc>
+                  <a:txBody>
+                    <a:bodyPr/>
+                    <a:lstStyle/>
+                    <a:p>
+                      <a:pPr algn="ctr"/>
+                      <a:endParaRPr lang="zh-CN" altLang="en-US">
+                        <a:latin typeface="华文楷体" panose="02010600040101010101" pitchFamily="2" charset="-122"/>
+                        <a:ea typeface="华文楷体" panose="02010600040101010101" pitchFamily="2" charset="-122"/>
+                      </a:endParaRPr>
+                    </a:p>
+                  </a:txBody>
+                  <a:tcPr/>
+                </a:tc>
+                <a:tc>
+                  <a:txBody>
+                    <a:bodyPr/>
+                    <a:lstStyle/>
+                    <a:p>
+                      <a:pPr algn="ctr"/>
+                      <a:endParaRPr lang="zh-CN" altLang="en-US">
+                        <a:latin typeface="华文楷体" panose="02010600040101010101" pitchFamily="2" charset="-122"/>
+                        <a:ea typeface="华文楷体" panose="02010600040101010101" pitchFamily="2" charset="-122"/>
+                      </a:endParaRPr>
+                    </a:p>
+                  </a:txBody>
+                  <a:tcPr/>
+                </a:tc>
+                <a:tc>
+                  <a:txBody>
+                    <a:bodyPr/>
+                    <a:lstStyle/>
+                    <a:p>
+                      <a:pPr algn="ctr"/>
+                      <a:endParaRPr lang="zh-CN" altLang="en-US">
+                        <a:latin typeface="华文楷体" panose="02010600040101010101" pitchFamily="2" charset="-122"/>
+                        <a:ea typeface="华文楷体" panose="02010600040101010101" pitchFamily="2" charset="-122"/>
+                      </a:endParaRPr>
+                    </a:p>
+                  </a:txBody>
+                  <a:tcPr/>
+                </a:tc>
+                <a:extLst>
+                  <a:ext uri="{0D108BD9-81ED-4DB2-BD59-A6C34878D82A}">
+                    <a16:rowId xmlns:a16="http://schemas.microsoft.com/office/drawing/2014/main" val="755493884"/>
+                  </a:ext>
+                </a:extLst>
+              </a:tr>
+              <a:tr h="370840">
+                <a:tc>
+                  <a:txBody>
+                    <a:bodyPr/>
+                    <a:lstStyle/>
+                    <a:p>
+                      <a:pPr algn="ctr"/>
+                      <a:endParaRPr lang="zh-CN" altLang="en-US">
+                        <a:latin typeface="华文楷体" panose="02010600040101010101" pitchFamily="2" charset="-122"/>
+                        <a:ea typeface="华文楷体" panose="02010600040101010101" pitchFamily="2" charset="-122"/>
+                      </a:endParaRPr>
+                    </a:p>
+                  </a:txBody>
+                  <a:tcPr/>
+                </a:tc>
+                <a:tc>
+                  <a:txBody>
+                    <a:bodyPr/>
+                    <a:lstStyle/>
+                    <a:p>
+                      <a:pPr algn="ctr"/>
+                      <a:endParaRPr lang="zh-CN" altLang="en-US">
+                        <a:latin typeface="华文楷体" panose="02010600040101010101" pitchFamily="2" charset="-122"/>
+                        <a:ea typeface="华文楷体" panose="02010600040101010101" pitchFamily="2" charset="-122"/>
+                      </a:endParaRPr>
+                    </a:p>
+                  </a:txBody>
+                  <a:tcPr/>
+                </a:tc>
+                <a:tc>
+                  <a:txBody>
+                    <a:bodyPr/>
+                    <a:lstStyle/>
+                    <a:p>
+                      <a:pPr algn="ctr"/>
+                      <a:endParaRPr lang="zh-CN" altLang="en-US">
+                        <a:latin typeface="华文楷体" panose="02010600040101010101" pitchFamily="2" charset="-122"/>
+                        <a:ea typeface="华文楷体" panose="02010600040101010101" pitchFamily="2" charset="-122"/>
+                      </a:endParaRPr>
+                    </a:p>
+                  </a:txBody>
+                  <a:tcPr/>
+                </a:tc>
+                <a:tc>
+                  <a:txBody>
+                    <a:bodyPr/>
+                    <a:lstStyle/>
+                    <a:p>
+                      <a:pPr algn="ctr"/>
+                      <a:endParaRPr lang="zh-CN" altLang="en-US">
+                        <a:latin typeface="华文楷体" panose="02010600040101010101" pitchFamily="2" charset="-122"/>
+                        <a:ea typeface="华文楷体" panose="02010600040101010101" pitchFamily="2" charset="-122"/>
+                      </a:endParaRPr>
+                    </a:p>
+                  </a:txBody>
+                  <a:tcPr/>
+                </a:tc>
+                <a:tc>
+                  <a:txBody>
+                    <a:bodyPr/>
+                    <a:lstStyle/>
+                    <a:p>
+                      <a:pPr algn="ctr"/>
+                      <a:endParaRPr lang="zh-CN" altLang="en-US">
+                        <a:latin typeface="华文楷体" panose="02010600040101010101" pitchFamily="2" charset="-122"/>
+                        <a:ea typeface="华文楷体" panose="02010600040101010101" pitchFamily="2" charset="-122"/>
+                      </a:endParaRPr>
+                    </a:p>
+                  </a:txBody>
+                  <a:tcPr/>
+                </a:tc>
+                <a:tc>
+                  <a:txBody>
+                    <a:bodyPr/>
+                    <a:lstStyle/>
+                    <a:p>
+                      <a:pPr algn="ctr"/>
+                      <a:endParaRPr lang="zh-CN" altLang="en-US">
+                        <a:latin typeface="华文楷体" panose="02010600040101010101" pitchFamily="2" charset="-122"/>
+                        <a:ea typeface="华文楷体" panose="02010600040101010101" pitchFamily="2" charset="-122"/>
+                      </a:endParaRPr>
+                    </a:p>
+                  </a:txBody>
+                  <a:tcPr/>
+                </a:tc>
+                <a:extLst>
+                  <a:ext uri="{0D108BD9-81ED-4DB2-BD59-A6C34878D82A}">
+                    <a16:rowId xmlns:a16="http://schemas.microsoft.com/office/drawing/2014/main" val="1846603179"/>
+                  </a:ext>
+                </a:extLst>
+              </a:tr>
+              <a:tr h="370840">
+                <a:tc>
+                  <a:txBody>
+                    <a:bodyPr/>
+                    <a:lstStyle/>
+                    <a:p>
+                      <a:pPr algn="ctr"/>
+                      <a:endParaRPr lang="zh-CN" altLang="en-US">
+                        <a:latin typeface="华文楷体" panose="02010600040101010101" pitchFamily="2" charset="-122"/>
+                        <a:ea typeface="华文楷体" panose="02010600040101010101" pitchFamily="2" charset="-122"/>
+                      </a:endParaRPr>
+                    </a:p>
+                  </a:txBody>
+                  <a:tcPr/>
+                </a:tc>
+                <a:tc>
+                  <a:txBody>
+                    <a:bodyPr/>
+                    <a:lstStyle/>
+                    <a:p>
+                      <a:pPr algn="ctr"/>
+                      <a:endParaRPr lang="zh-CN" altLang="en-US">
+                        <a:latin typeface="华文楷体" panose="02010600040101010101" pitchFamily="2" charset="-122"/>
+                        <a:ea typeface="华文楷体" panose="02010600040101010101" pitchFamily="2" charset="-122"/>
+                      </a:endParaRPr>
+                    </a:p>
+                  </a:txBody>
+                  <a:tcPr/>
+                </a:tc>
+                <a:tc>
+                  <a:txBody>
+                    <a:bodyPr/>
+                    <a:lstStyle/>
+                    <a:p>
+                      <a:pPr algn="ctr"/>
+                      <a:endParaRPr lang="zh-CN" altLang="en-US">
+                        <a:latin typeface="华文楷体" panose="02010600040101010101" pitchFamily="2" charset="-122"/>
+                        <a:ea typeface="华文楷体" panose="02010600040101010101" pitchFamily="2" charset="-122"/>
+                      </a:endParaRPr>
+                    </a:p>
+                  </a:txBody>
+                  <a:tcPr/>
+                </a:tc>
+                <a:tc>
+                  <a:txBody>
+                    <a:bodyPr/>
+                    <a:lstStyle/>
+                    <a:p>
+                      <a:pPr algn="ctr"/>
+                      <a:endParaRPr lang="zh-CN" altLang="en-US">
+                        <a:latin typeface="华文楷体" panose="02010600040101010101" pitchFamily="2" charset="-122"/>
+                        <a:ea typeface="华文楷体" panose="02010600040101010101" pitchFamily="2" charset="-122"/>
+                      </a:endParaRPr>
+                    </a:p>
+                  </a:txBody>
+                  <a:tcPr/>
+                </a:tc>
+                <a:tc>
+                  <a:txBody>
+                    <a:bodyPr/>
+                    <a:lstStyle/>
+                    <a:p>
+                      <a:pPr algn="ctr"/>
+                      <a:endParaRPr lang="zh-CN" altLang="en-US">
+                        <a:latin typeface="华文楷体" panose="02010600040101010101" pitchFamily="2" charset="-122"/>
+                        <a:ea typeface="华文楷体" panose="02010600040101010101" pitchFamily="2" charset="-122"/>
+                      </a:endParaRPr>
+                    </a:p>
+                  </a:txBody>
+                  <a:tcPr/>
+                </a:tc>
+                <a:tc>
+                  <a:txBody>
+                    <a:bodyPr/>
+                    <a:lstStyle/>
+                    <a:p>
+                      <a:pPr algn="ctr"/>
+                      <a:endParaRPr lang="zh-CN" altLang="en-US">
+                        <a:latin typeface="华文楷体" panose="02010600040101010101" pitchFamily="2" charset="-122"/>
+                        <a:ea typeface="华文楷体" panose="02010600040101010101" pitchFamily="2" charset="-122"/>
+                      </a:endParaRPr>
+                    </a:p>
+                  </a:txBody>
+                  <a:tcPr/>
+                </a:tc>
+                <a:extLst>
+                  <a:ext uri="{0D108BD9-81ED-4DB2-BD59-A6C34878D82A}">
+                    <a16:rowId xmlns:a16="http://schemas.microsoft.com/office/drawing/2014/main" val="2604970251"/>
+                  </a:ext>
+                </a:extLst>
+              </a:tr>
+              <a:tr h="370840">
+                <a:tc>
+                  <a:txBody>
+                    <a:bodyPr/>
+                    <a:lstStyle/>
+                    <a:p>
+                      <a:pPr algn="ctr"/>
+                      <a:endParaRPr lang="zh-CN" altLang="en-US">
+                        <a:latin typeface="华文楷体" panose="02010600040101010101" pitchFamily="2" charset="-122"/>
+                        <a:ea typeface="华文楷体" panose="02010600040101010101" pitchFamily="2" charset="-122"/>
+                      </a:endParaRPr>
+                    </a:p>
+                  </a:txBody>
+                  <a:tcPr/>
+                </a:tc>
+                <a:tc>
+                  <a:txBody>
+                    <a:bodyPr/>
+                    <a:lstStyle/>
+                    <a:p>
+                      <a:pPr algn="ctr"/>
+                      <a:endParaRPr lang="zh-CN" altLang="en-US">
+                        <a:latin typeface="华文楷体" panose="02010600040101010101" pitchFamily="2" charset="-122"/>
+                        <a:ea typeface="华文楷体" panose="02010600040101010101" pitchFamily="2" charset="-122"/>
+                      </a:endParaRPr>
+                    </a:p>
+                  </a:txBody>
+                  <a:tcPr/>
+                </a:tc>
+                <a:tc>
+                  <a:txBody>
+                    <a:bodyPr/>
+                    <a:lstStyle/>
+                    <a:p>
+                      <a:pPr algn="ctr"/>
+                      <a:endParaRPr lang="zh-CN" altLang="en-US">
+                        <a:latin typeface="华文楷体" panose="02010600040101010101" pitchFamily="2" charset="-122"/>
+                        <a:ea typeface="华文楷体" panose="02010600040101010101" pitchFamily="2" charset="-122"/>
+                      </a:endParaRPr>
+                    </a:p>
+                  </a:txBody>
+                  <a:tcPr/>
+                </a:tc>
+                <a:tc>
+                  <a:txBody>
+                    <a:bodyPr/>
+                    <a:lstStyle/>
+                    <a:p>
+                      <a:pPr algn="ctr"/>
+                      <a:endParaRPr lang="zh-CN" altLang="en-US">
+                        <a:latin typeface="华文楷体" panose="02010600040101010101" pitchFamily="2" charset="-122"/>
+                        <a:ea typeface="华文楷体" panose="02010600040101010101" pitchFamily="2" charset="-122"/>
+                      </a:endParaRPr>
+                    </a:p>
+                  </a:txBody>
+                  <a:tcPr/>
+                </a:tc>
+                <a:tc>
+                  <a:txBody>
+                    <a:bodyPr/>
+                    <a:lstStyle/>
+                    <a:p>
+                      <a:pPr algn="ctr"/>
+                      <a:endParaRPr lang="zh-CN" altLang="en-US">
+                        <a:latin typeface="华文楷体" panose="02010600040101010101" pitchFamily="2" charset="-122"/>
+                        <a:ea typeface="华文楷体" panose="02010600040101010101" pitchFamily="2" charset="-122"/>
+                      </a:endParaRPr>
+                    </a:p>
+                  </a:txBody>
+                  <a:tcPr/>
+                </a:tc>
+                <a:tc>
+                  <a:txBody>
+                    <a:bodyPr/>
+                    <a:lstStyle/>
+                    <a:p>
+                      <a:pPr algn="ctr"/>
+                      <a:endParaRPr lang="zh-CN" altLang="en-US">
+                        <a:latin typeface="华文楷体" panose="02010600040101010101" pitchFamily="2" charset="-122"/>
+                        <a:ea typeface="华文楷体" panose="02010600040101010101" pitchFamily="2" charset="-122"/>
+                      </a:endParaRPr>
+                    </a:p>
+                  </a:txBody>
+                  <a:tcPr/>
+                </a:tc>
+                <a:extLst>
+                  <a:ext uri="{0D108BD9-81ED-4DB2-BD59-A6C34878D82A}">
+                    <a16:rowId xmlns:a16="http://schemas.microsoft.com/office/drawing/2014/main" val="1098620589"/>
+                  </a:ext>
+                </a:extLst>
+              </a:tr>
+              <a:tr h="370840">
+                <a:tc>
+                  <a:txBody>
+                    <a:bodyPr/>
+                    <a:lstStyle/>
+                    <a:p>
+                      <a:pPr algn="ctr"/>
+                      <a:endParaRPr lang="zh-CN" altLang="en-US">
+                        <a:latin typeface="华文楷体" panose="02010600040101010101" pitchFamily="2" charset="-122"/>
+                        <a:ea typeface="华文楷体" panose="02010600040101010101" pitchFamily="2" charset="-122"/>
+                      </a:endParaRPr>
+                    </a:p>
+                  </a:txBody>
+                  <a:tcPr/>
+                </a:tc>
+                <a:tc>
+                  <a:txBody>
+                    <a:bodyPr/>
+                    <a:lstStyle/>
+                    <a:p>
+                      <a:pPr algn="ctr"/>
+                      <a:endParaRPr lang="zh-CN" altLang="en-US">
+                        <a:latin typeface="华文楷体" panose="02010600040101010101" pitchFamily="2" charset="-122"/>
+                        <a:ea typeface="华文楷体" panose="02010600040101010101" pitchFamily="2" charset="-122"/>
+                      </a:endParaRPr>
+                    </a:p>
+                  </a:txBody>
+                  <a:tcPr/>
+                </a:tc>
+                <a:tc>
+                  <a:txBody>
+                    <a:bodyPr/>
+                    <a:lstStyle/>
+                    <a:p>
+                      <a:pPr algn="ctr"/>
+                      <a:endParaRPr lang="zh-CN" altLang="en-US">
+                        <a:latin typeface="华文楷体" panose="02010600040101010101" pitchFamily="2" charset="-122"/>
+                        <a:ea typeface="华文楷体" panose="02010600040101010101" pitchFamily="2" charset="-122"/>
+                      </a:endParaRPr>
+                    </a:p>
+                  </a:txBody>
+                  <a:tcPr/>
+                </a:tc>
+                <a:tc>
+                  <a:txBody>
+                    <a:bodyPr/>
+                    <a:lstStyle/>
+                    <a:p>
+                      <a:pPr algn="ctr"/>
+                      <a:endParaRPr lang="zh-CN" altLang="en-US">
+                        <a:latin typeface="华文楷体" panose="02010600040101010101" pitchFamily="2" charset="-122"/>
+                        <a:ea typeface="华文楷体" panose="02010600040101010101" pitchFamily="2" charset="-122"/>
+                      </a:endParaRPr>
+                    </a:p>
+                  </a:txBody>
+                  <a:tcPr/>
+                </a:tc>
+                <a:tc>
+                  <a:txBody>
+                    <a:bodyPr/>
+                    <a:lstStyle/>
+                    <a:p>
+                      <a:pPr algn="ctr"/>
+                      <a:endParaRPr lang="zh-CN" altLang="en-US">
+                        <a:latin typeface="华文楷体" panose="02010600040101010101" pitchFamily="2" charset="-122"/>
+                        <a:ea typeface="华文楷体" panose="02010600040101010101" pitchFamily="2" charset="-122"/>
+                      </a:endParaRPr>
+                    </a:p>
+                  </a:txBody>
+                  <a:tcPr/>
+                </a:tc>
+                <a:tc>
+                  <a:txBody>
+                    <a:bodyPr/>
+                    <a:lstStyle/>
+                    <a:p>
+                      <a:pPr algn="ctr"/>
+                      <a:endParaRPr lang="zh-CN" altLang="en-US">
+                        <a:latin typeface="华文楷体" panose="02010600040101010101" pitchFamily="2" charset="-122"/>
+                        <a:ea typeface="华文楷体" panose="02010600040101010101" pitchFamily="2" charset="-122"/>
+                      </a:endParaRPr>
+                    </a:p>
+                  </a:txBody>
+                  <a:tcPr/>
+                </a:tc>
+                <a:extLst>
+                  <a:ext uri="{0D108BD9-81ED-4DB2-BD59-A6C34878D82A}">
+                    <a16:rowId xmlns:a16="http://schemas.microsoft.com/office/drawing/2014/main" val="3812877693"/>
+                  </a:ext>
+                </a:extLst>
+              </a:tr>
+              <a:tr h="370840">
+                <a:tc>
+                  <a:txBody>
+                    <a:bodyPr/>
+                    <a:lstStyle/>
+                    <a:p>
+                      <a:pPr algn="ctr"/>
+                      <a:endParaRPr lang="zh-CN" altLang="en-US">
+                        <a:latin typeface="华文楷体" panose="02010600040101010101" pitchFamily="2" charset="-122"/>
+                        <a:ea typeface="华文楷体" panose="02010600040101010101" pitchFamily="2" charset="-122"/>
+                      </a:endParaRPr>
+                    </a:p>
+                  </a:txBody>
+                  <a:tcPr/>
+                </a:tc>
+                <a:tc>
+                  <a:txBody>
+                    <a:bodyPr/>
+                    <a:lstStyle/>
+                    <a:p>
+                      <a:pPr algn="ctr"/>
+                      <a:endParaRPr lang="zh-CN" altLang="en-US">
+                        <a:latin typeface="华文楷体" panose="02010600040101010101" pitchFamily="2" charset="-122"/>
+                        <a:ea typeface="华文楷体" panose="02010600040101010101" pitchFamily="2" charset="-122"/>
+                      </a:endParaRPr>
+                    </a:p>
+                  </a:txBody>
+                  <a:tcPr/>
+                </a:tc>
+                <a:tc>
+                  <a:txBody>
+                    <a:bodyPr/>
+                    <a:lstStyle/>
+                    <a:p>
+                      <a:pPr algn="ctr"/>
+                      <a:endParaRPr lang="zh-CN" altLang="en-US">
+                        <a:latin typeface="华文楷体" panose="02010600040101010101" pitchFamily="2" charset="-122"/>
+                        <a:ea typeface="华文楷体" panose="02010600040101010101" pitchFamily="2" charset="-122"/>
+                      </a:endParaRPr>
+                    </a:p>
+                  </a:txBody>
+                  <a:tcPr/>
+                </a:tc>
+                <a:tc>
+                  <a:txBody>
+                    <a:bodyPr/>
+                    <a:lstStyle/>
+                    <a:p>
+                      <a:pPr algn="ctr"/>
+                      <a:endParaRPr lang="zh-CN" altLang="en-US">
+                        <a:latin typeface="华文楷体" panose="02010600040101010101" pitchFamily="2" charset="-122"/>
+                        <a:ea typeface="华文楷体" panose="02010600040101010101" pitchFamily="2" charset="-122"/>
+                      </a:endParaRPr>
+                    </a:p>
+                  </a:txBody>
+                  <a:tcPr/>
+                </a:tc>
+                <a:tc>
+                  <a:txBody>
+                    <a:bodyPr/>
+                    <a:lstStyle/>
+                    <a:p>
+                      <a:pPr algn="ctr"/>
+                      <a:endParaRPr lang="zh-CN" altLang="en-US">
+                        <a:latin typeface="华文楷体" panose="02010600040101010101" pitchFamily="2" charset="-122"/>
+                        <a:ea typeface="华文楷体" panose="02010600040101010101" pitchFamily="2" charset="-122"/>
+                      </a:endParaRPr>
+                    </a:p>
+                  </a:txBody>
+                  <a:tcPr/>
+                </a:tc>
+                <a:tc>
+                  <a:txBody>
+                    <a:bodyPr/>
+                    <a:lstStyle/>
+                    <a:p>
+                      <a:pPr algn="ctr"/>
+                      <a:endParaRPr lang="zh-CN" altLang="en-US">
+                        <a:latin typeface="华文楷体" panose="02010600040101010101" pitchFamily="2" charset="-122"/>
+                        <a:ea typeface="华文楷体" panose="02010600040101010101" pitchFamily="2" charset="-122"/>
+                      </a:endParaRPr>
+                    </a:p>
+                  </a:txBody>
+                  <a:tcPr/>
+                </a:tc>
+                <a:extLst>
+                  <a:ext uri="{0D108BD9-81ED-4DB2-BD59-A6C34878D82A}">
+                    <a16:rowId xmlns:a16="http://schemas.microsoft.com/office/drawing/2014/main" val="2153666523"/>
+                  </a:ext>
+                </a:extLst>
+              </a:tr>
+              <a:tr h="370840">
+                <a:tc>
+                  <a:txBody>
+                    <a:bodyPr/>
+                    <a:lstStyle/>
+                    <a:p>
+                      <a:pPr algn="ctr"/>
+                      <a:endParaRPr lang="zh-CN" altLang="en-US">
+                        <a:latin typeface="华文楷体" panose="02010600040101010101" pitchFamily="2" charset="-122"/>
+                        <a:ea typeface="华文楷体" panose="02010600040101010101" pitchFamily="2" charset="-122"/>
+                      </a:endParaRPr>
+                    </a:p>
+                  </a:txBody>
+                  <a:tcPr/>
+                </a:tc>
+                <a:tc>
+                  <a:txBody>
+                    <a:bodyPr/>
+                    <a:lstStyle/>
+                    <a:p>
+                      <a:pPr algn="ctr"/>
+                      <a:endParaRPr lang="zh-CN" altLang="en-US">
+                        <a:latin typeface="华文楷体" panose="02010600040101010101" pitchFamily="2" charset="-122"/>
+                        <a:ea typeface="华文楷体" panose="02010600040101010101" pitchFamily="2" charset="-122"/>
+                      </a:endParaRPr>
+                    </a:p>
+                  </a:txBody>
+                  <a:tcPr/>
+                </a:tc>
+                <a:tc>
+                  <a:txBody>
+                    <a:bodyPr/>
+                    <a:lstStyle/>
+                    <a:p>
+                      <a:pPr algn="ctr"/>
+                      <a:endParaRPr lang="zh-CN" altLang="en-US">
+                        <a:latin typeface="华文楷体" panose="02010600040101010101" pitchFamily="2" charset="-122"/>
+                        <a:ea typeface="华文楷体" panose="02010600040101010101" pitchFamily="2" charset="-122"/>
+                      </a:endParaRPr>
+                    </a:p>
+                  </a:txBody>
+                  <a:tcPr/>
+                </a:tc>
+                <a:tc>
+                  <a:txBody>
+                    <a:bodyPr/>
+                    <a:lstStyle/>
+                    <a:p>
+                      <a:pPr algn="ctr"/>
+                      <a:endParaRPr lang="zh-CN" altLang="en-US">
+                        <a:latin typeface="华文楷体" panose="02010600040101010101" pitchFamily="2" charset="-122"/>
+                        <a:ea typeface="华文楷体" panose="02010600040101010101" pitchFamily="2" charset="-122"/>
+                      </a:endParaRPr>
+                    </a:p>
+                  </a:txBody>
+                  <a:tcPr/>
+                </a:tc>
+                <a:tc>
+                  <a:txBody>
+                    <a:bodyPr/>
+                    <a:lstStyle/>
+                    <a:p>
+                      <a:pPr algn="ctr"/>
+                      <a:endParaRPr lang="zh-CN" altLang="en-US">
+                        <a:latin typeface="华文楷体" panose="02010600040101010101" pitchFamily="2" charset="-122"/>
+                        <a:ea typeface="华文楷体" panose="02010600040101010101" pitchFamily="2" charset="-122"/>
+                      </a:endParaRPr>
+                    </a:p>
+                  </a:txBody>
+                  <a:tcPr/>
+                </a:tc>
+                <a:tc>
+                  <a:txBody>
+                    <a:bodyPr/>
+                    <a:lstStyle/>
+                    <a:p>
+                      <a:pPr algn="ctr"/>
+                      <a:endParaRPr lang="zh-CN" altLang="en-US">
+                        <a:latin typeface="华文楷体" panose="02010600040101010101" pitchFamily="2" charset="-122"/>
+                        <a:ea typeface="华文楷体" panose="02010600040101010101" pitchFamily="2" charset="-122"/>
+                      </a:endParaRPr>
+                    </a:p>
+                  </a:txBody>
+                  <a:tcPr/>
+                </a:tc>
+                <a:extLst>
+                  <a:ext uri="{0D108BD9-81ED-4DB2-BD59-A6C34878D82A}">
+                    <a16:rowId xmlns:a16="http://schemas.microsoft.com/office/drawing/2014/main" val="2393810294"/>
+                  </a:ext>
+                </a:extLst>
+              </a:tr>
+              <a:tr h="370840">
+                <a:tc>
+                  <a:txBody>
+                    <a:bodyPr/>
+                    <a:lstStyle/>
+                    <a:p>
+                      <a:pPr algn="ctr"/>
+                      <a:endParaRPr lang="zh-CN" altLang="en-US">
+                        <a:latin typeface="华文楷体" panose="02010600040101010101" pitchFamily="2" charset="-122"/>
+                        <a:ea typeface="华文楷体" panose="02010600040101010101" pitchFamily="2" charset="-122"/>
+                      </a:endParaRPr>
+                    </a:p>
+                  </a:txBody>
+                  <a:tcPr/>
+                </a:tc>
+                <a:tc>
+                  <a:txBody>
+                    <a:bodyPr/>
+                    <a:lstStyle/>
+                    <a:p>
+                      <a:pPr algn="ctr"/>
+                      <a:endParaRPr lang="zh-CN" altLang="en-US">
+                        <a:latin typeface="华文楷体" panose="02010600040101010101" pitchFamily="2" charset="-122"/>
+                        <a:ea typeface="华文楷体" panose="02010600040101010101" pitchFamily="2" charset="-122"/>
+                      </a:endParaRPr>
+                    </a:p>
+                  </a:txBody>
+                  <a:tcPr/>
+                </a:tc>
+                <a:tc>
+                  <a:txBody>
+                    <a:bodyPr/>
+                    <a:lstStyle/>
+                    <a:p>
+                      <a:pPr algn="ctr"/>
+                      <a:endParaRPr lang="zh-CN" altLang="en-US">
+                        <a:latin typeface="华文楷体" panose="02010600040101010101" pitchFamily="2" charset="-122"/>
+                        <a:ea typeface="华文楷体" panose="02010600040101010101" pitchFamily="2" charset="-122"/>
+                      </a:endParaRPr>
+                    </a:p>
+                  </a:txBody>
+                  <a:tcPr/>
+                </a:tc>
+                <a:tc>
+                  <a:txBody>
+                    <a:bodyPr/>
+                    <a:lstStyle/>
+                    <a:p>
+                      <a:pPr algn="ctr"/>
+                      <a:endParaRPr lang="zh-CN" altLang="en-US">
+                        <a:latin typeface="华文楷体" panose="02010600040101010101" pitchFamily="2" charset="-122"/>
+                        <a:ea typeface="华文楷体" panose="02010600040101010101" pitchFamily="2" charset="-122"/>
+                      </a:endParaRPr>
+                    </a:p>
+                  </a:txBody>
+                  <a:tcPr/>
+                </a:tc>
+                <a:tc>
+                  <a:txBody>
+                    <a:bodyPr/>
+                    <a:lstStyle/>
+                    <a:p>
+                      <a:pPr algn="ctr"/>
+                      <a:endParaRPr lang="zh-CN" altLang="en-US">
+                        <a:latin typeface="华文楷体" panose="02010600040101010101" pitchFamily="2" charset="-122"/>
+                        <a:ea typeface="华文楷体" panose="02010600040101010101" pitchFamily="2" charset="-122"/>
+                      </a:endParaRPr>
+                    </a:p>
+                  </a:txBody>
+                  <a:tcPr/>
+                </a:tc>
+                <a:tc>
+                  <a:txBody>
+                    <a:bodyPr/>
+                    <a:lstStyle/>
+                    <a:p>
+                      <a:pPr algn="ctr"/>
+                      <a:endParaRPr lang="zh-CN" altLang="en-US">
+                        <a:latin typeface="华文楷体" panose="02010600040101010101" pitchFamily="2" charset="-122"/>
+                        <a:ea typeface="华文楷体" panose="02010600040101010101" pitchFamily="2" charset="-122"/>
+                      </a:endParaRPr>
+                    </a:p>
+                  </a:txBody>
+                  <a:tcPr/>
+                </a:tc>
+                <a:extLst>
+                  <a:ext uri="{0D108BD9-81ED-4DB2-BD59-A6C34878D82A}">
+                    <a16:rowId xmlns:a16="http://schemas.microsoft.com/office/drawing/2014/main" val="1275106947"/>
+                  </a:ext>
+                </a:extLst>
+              </a:tr>
+            </a:tbl>
+          </a:graphicData>
+        </a:graphic>
+      </p:graphicFrame>
+      <p:sp>
+        <p:nvSpPr>
+          <p:cNvPr id="8" name="文本框 7"/>
+          <p:cNvSpPr txBox="1"/>
+          <p:nvPr/>
+        </p:nvSpPr>
+        <p:spPr>
+          <a:xfrm>
+            <a:off x="73892" y="684074"/>
+            <a:ext cx="2715491" cy="369332"/>
+          </a:xfrm>
+          <a:prstGeom prst="rect">
+            <a:avLst/>
+          </a:prstGeom>
+          <a:noFill/>
+        </p:spPr>
+        <p:txBody>
+          <a:bodyPr wrap="square" rtlCol="0">
+            <a:spAutoFit/>
+          </a:bodyPr>
+          <a:lstStyle/>
+          <a:p>
+            <a:pPr algn="ctr"/>
+            <a:r>
+              <a:rPr lang="en-US" altLang="zh-CN" smtClean="0">
+                <a:latin typeface="华文楷体" panose="02010600040101010101" pitchFamily="2" charset="-122"/>
+                <a:ea typeface="华文楷体" panose="02010600040101010101" pitchFamily="2" charset="-122"/>
+              </a:rPr>
+              <a:t>relayId[PDU_MAX_NUM]</a:t>
+            </a:r>
+            <a:endParaRPr lang="zh-CN" altLang="en-US">
+              <a:latin typeface="华文楷体" panose="02010600040101010101" pitchFamily="2" charset="-122"/>
+              <a:ea typeface="华文楷体" panose="02010600040101010101" pitchFamily="2" charset="-122"/>
+            </a:endParaRPr>
+          </a:p>
+        </p:txBody>
+      </p:sp>
+      <p:sp>
+        <p:nvSpPr>
+          <p:cNvPr id="9" name="文本框 8"/>
+          <p:cNvSpPr txBox="1"/>
+          <p:nvPr/>
+        </p:nvSpPr>
+        <p:spPr>
+          <a:xfrm>
+            <a:off x="4421909" y="684074"/>
+            <a:ext cx="3024908" cy="369332"/>
+          </a:xfrm>
+          <a:prstGeom prst="rect">
+            <a:avLst/>
+          </a:prstGeom>
+          <a:noFill/>
+        </p:spPr>
+        <p:txBody>
+          <a:bodyPr wrap="square" rtlCol="0">
+            <a:spAutoFit/>
+          </a:bodyPr>
+          <a:lstStyle/>
+          <a:p>
+            <a:pPr algn="ctr"/>
+            <a:r>
+              <a:rPr lang="en-US" altLang="zh-CN" smtClean="0">
+                <a:latin typeface="华文楷体" panose="02010600040101010101" pitchFamily="2" charset="-122"/>
+                <a:ea typeface="华文楷体" panose="02010600040101010101" pitchFamily="2" charset="-122"/>
+              </a:rPr>
+              <a:t>relaySW[PDU_MAX_NUM][6]</a:t>
+            </a:r>
+            <a:endParaRPr lang="zh-CN" altLang="en-US">
+              <a:latin typeface="华文楷体" panose="02010600040101010101" pitchFamily="2" charset="-122"/>
+              <a:ea typeface="华文楷体" panose="02010600040101010101" pitchFamily="2" charset="-122"/>
+            </a:endParaRPr>
+          </a:p>
+        </p:txBody>
+      </p:sp>
+      <p:sp>
+        <p:nvSpPr>
+          <p:cNvPr id="11" name="矩形 10"/>
+          <p:cNvSpPr/>
+          <p:nvPr/>
+        </p:nvSpPr>
+        <p:spPr>
+          <a:xfrm>
+            <a:off x="837045" y="5791476"/>
+            <a:ext cx="10517910" cy="830997"/>
+          </a:xfrm>
+          <a:prstGeom prst="rect">
+            <a:avLst/>
+          </a:prstGeom>
+        </p:spPr>
+        <p:txBody>
+          <a:bodyPr wrap="square">
+            <a:spAutoFit/>
+          </a:bodyPr>
+          <a:lstStyle/>
+          <a:p>
+            <a:pPr algn="ctr"/>
+            <a:r>
+              <a:rPr lang="zh-CN" altLang="en-US" sz="1600" b="1">
+                <a:latin typeface="华文楷体" panose="02010600040101010101" pitchFamily="2" charset="-122"/>
+                <a:ea typeface="华文楷体" panose="02010600040101010101" pitchFamily="2" charset="-122"/>
+              </a:rPr>
+              <a:t>解释举例</a:t>
+            </a:r>
+            <a:r>
+              <a:rPr lang="zh-CN" altLang="en-US" sz="1600">
+                <a:latin typeface="华文楷体" panose="02010600040101010101" pitchFamily="2" charset="-122"/>
+                <a:ea typeface="华文楷体" panose="02010600040101010101" pitchFamily="2" charset="-122"/>
+              </a:rPr>
+              <a:t>：第一行的帧组包是，继电器</a:t>
+            </a:r>
+            <a:r>
+              <a:rPr lang="en-US" altLang="zh-CN" sz="1600">
+                <a:latin typeface="华文楷体" panose="02010600040101010101" pitchFamily="2" charset="-122"/>
+                <a:ea typeface="华文楷体" panose="02010600040101010101" pitchFamily="2" charset="-122"/>
+              </a:rPr>
+              <a:t>id</a:t>
+            </a:r>
+            <a:r>
+              <a:rPr lang="zh-CN" altLang="en-US" sz="1600">
+                <a:latin typeface="华文楷体" panose="02010600040101010101" pitchFamily="2" charset="-122"/>
+                <a:ea typeface="华文楷体" panose="02010600040101010101" pitchFamily="2" charset="-122"/>
+              </a:rPr>
+              <a:t>值是</a:t>
+            </a:r>
+            <a:r>
+              <a:rPr lang="en-US" altLang="zh-CN" sz="1600">
+                <a:latin typeface="华文楷体" panose="02010600040101010101" pitchFamily="2" charset="-122"/>
+                <a:ea typeface="华文楷体" panose="02010600040101010101" pitchFamily="2" charset="-122"/>
+              </a:rPr>
+              <a:t>2</a:t>
+            </a:r>
+            <a:r>
+              <a:rPr lang="zh-CN" altLang="en-US" sz="1600">
+                <a:latin typeface="华文楷体" panose="02010600040101010101" pitchFamily="2" charset="-122"/>
+                <a:ea typeface="华文楷体" panose="02010600040101010101" pitchFamily="2" charset="-122"/>
+              </a:rPr>
+              <a:t>（</a:t>
+            </a:r>
+            <a:r>
+              <a:rPr lang="en-US" altLang="zh-CN" sz="1600" u="sng">
+                <a:latin typeface="华文楷体" panose="02010600040101010101" pitchFamily="2" charset="-122"/>
+                <a:ea typeface="华文楷体" panose="02010600040101010101" pitchFamily="2" charset="-122"/>
+              </a:rPr>
+              <a:t>relayId[0]</a:t>
+            </a:r>
+            <a:r>
+              <a:rPr lang="zh-CN" altLang="en-US" sz="1600">
+                <a:latin typeface="华文楷体" panose="02010600040101010101" pitchFamily="2" charset="-122"/>
+                <a:ea typeface="华文楷体" panose="02010600040101010101" pitchFamily="2" charset="-122"/>
+              </a:rPr>
+              <a:t>），该继电器对应的继电器关合状态是</a:t>
+            </a:r>
+            <a:r>
+              <a:rPr lang="en-US" altLang="zh-CN" sz="1600">
+                <a:latin typeface="华文楷体" panose="02010600040101010101" pitchFamily="2" charset="-122"/>
+                <a:ea typeface="华文楷体" panose="02010600040101010101" pitchFamily="2" charset="-122"/>
+              </a:rPr>
+              <a:t>011000</a:t>
+            </a:r>
+            <a:r>
+              <a:rPr lang="zh-CN" altLang="en-US" sz="1600">
+                <a:latin typeface="华文楷体" panose="02010600040101010101" pitchFamily="2" charset="-122"/>
+                <a:ea typeface="华文楷体" panose="02010600040101010101" pitchFamily="2" charset="-122"/>
+              </a:rPr>
+              <a:t>（</a:t>
+            </a:r>
+            <a:r>
+              <a:rPr lang="en-US" altLang="zh-CN" sz="1600" u="sng">
+                <a:latin typeface="华文楷体" panose="02010600040101010101" pitchFamily="2" charset="-122"/>
+                <a:ea typeface="华文楷体" panose="02010600040101010101" pitchFamily="2" charset="-122"/>
+              </a:rPr>
+              <a:t>relaySW[0]</a:t>
+            </a:r>
+            <a:r>
+              <a:rPr lang="zh-CN" altLang="en-US" sz="1600">
+                <a:latin typeface="华文楷体" panose="02010600040101010101" pitchFamily="2" charset="-122"/>
+                <a:ea typeface="华文楷体" panose="02010600040101010101" pitchFamily="2" charset="-122"/>
+              </a:rPr>
+              <a:t>）（部署某枪的策略是把这些继电器值全部发送出去）</a:t>
+            </a:r>
+          </a:p>
+          <a:p>
+            <a:pPr algn="ctr"/>
+            <a:endParaRPr lang="zh-CN" altLang="en-US" sz="1600">
+              <a:latin typeface="华文楷体" panose="02010600040101010101" pitchFamily="2" charset="-122"/>
+              <a:ea typeface="华文楷体" panose="02010600040101010101" pitchFamily="2" charset="-122"/>
+            </a:endParaRPr>
+          </a:p>
+        </p:txBody>
+      </p:sp>
+      <p:sp>
+        <p:nvSpPr>
+          <p:cNvPr id="10" name="文本框 9"/>
+          <p:cNvSpPr txBox="1"/>
+          <p:nvPr/>
+        </p:nvSpPr>
+        <p:spPr>
+          <a:xfrm>
+            <a:off x="8248071" y="2090172"/>
+            <a:ext cx="3943929" cy="2677656"/>
+          </a:xfrm>
+          <a:prstGeom prst="rect">
+            <a:avLst/>
+          </a:prstGeom>
+          <a:noFill/>
+          <a:ln>
+            <a:solidFill>
+              <a:schemeClr val="tx1"/>
+            </a:solidFill>
+          </a:ln>
+        </p:spPr>
+        <p:txBody>
+          <a:bodyPr wrap="square" rtlCol="0">
+            <a:spAutoFit/>
+          </a:bodyPr>
+          <a:lstStyle/>
+          <a:p>
+            <a:pPr algn="ctr"/>
+            <a:r>
+              <a:rPr lang="zh-CN" altLang="en-US" sz="1400" smtClean="0">
+                <a:latin typeface="华文楷体" panose="02010600040101010101" pitchFamily="2" charset="-122"/>
+                <a:ea typeface="华文楷体" panose="02010600040101010101" pitchFamily="2" charset="-122"/>
+              </a:rPr>
+              <a:t>还有一个变量是</a:t>
+            </a:r>
+            <a:r>
+              <a:rPr lang="en-US" altLang="zh-CN" sz="1400" smtClean="0">
+                <a:latin typeface="华文楷体" panose="02010600040101010101" pitchFamily="2" charset="-122"/>
+                <a:ea typeface="华文楷体" panose="02010600040101010101" pitchFamily="2" charset="-122"/>
+              </a:rPr>
+              <a:t>relayNum</a:t>
+            </a:r>
+            <a:r>
+              <a:rPr lang="zh-CN" altLang="en-US" sz="1400" smtClean="0">
+                <a:latin typeface="华文楷体" panose="02010600040101010101" pitchFamily="2" charset="-122"/>
+                <a:ea typeface="华文楷体" panose="02010600040101010101" pitchFamily="2" charset="-122"/>
+              </a:rPr>
+              <a:t>，用来轮询</a:t>
+            </a:r>
+            <a:r>
+              <a:rPr lang="en-US" altLang="zh-CN" sz="1400" smtClean="0">
+                <a:latin typeface="华文楷体" panose="02010600040101010101" pitchFamily="2" charset="-122"/>
+                <a:ea typeface="华文楷体" panose="02010600040101010101" pitchFamily="2" charset="-122"/>
+              </a:rPr>
+              <a:t>relayId</a:t>
+            </a:r>
+            <a:r>
+              <a:rPr lang="zh-CN" altLang="en-US" sz="1400" smtClean="0">
+                <a:latin typeface="华文楷体" panose="02010600040101010101" pitchFamily="2" charset="-122"/>
+                <a:ea typeface="华文楷体" panose="02010600040101010101" pitchFamily="2" charset="-122"/>
+              </a:rPr>
+              <a:t>数组的（就算</a:t>
+            </a:r>
+            <a:r>
+              <a:rPr lang="en-US" altLang="zh-CN" sz="1400" smtClean="0">
+                <a:latin typeface="华文楷体" panose="02010600040101010101" pitchFamily="2" charset="-122"/>
+                <a:ea typeface="华文楷体" panose="02010600040101010101" pitchFamily="2" charset="-122"/>
+              </a:rPr>
+              <a:t>relayId</a:t>
+            </a:r>
+            <a:r>
+              <a:rPr lang="zh-CN" altLang="en-US" sz="1400" smtClean="0">
+                <a:latin typeface="华文楷体" panose="02010600040101010101" pitchFamily="2" charset="-122"/>
+                <a:ea typeface="华文楷体" panose="02010600040101010101" pitchFamily="2" charset="-122"/>
+              </a:rPr>
+              <a:t>有</a:t>
+            </a:r>
+            <a:r>
+              <a:rPr lang="en-US" altLang="zh-CN" sz="1400" smtClean="0">
+                <a:latin typeface="华文楷体" panose="02010600040101010101" pitchFamily="2" charset="-122"/>
+                <a:ea typeface="华文楷体" panose="02010600040101010101" pitchFamily="2" charset="-122"/>
+              </a:rPr>
+              <a:t>4</a:t>
+            </a:r>
+            <a:r>
+              <a:rPr lang="zh-CN" altLang="en-US" sz="1400" smtClean="0">
+                <a:latin typeface="华文楷体" panose="02010600040101010101" pitchFamily="2" charset="-122"/>
+                <a:ea typeface="华文楷体" panose="02010600040101010101" pitchFamily="2" charset="-122"/>
+              </a:rPr>
+              <a:t>个</a:t>
+            </a:r>
+            <a:r>
+              <a:rPr lang="en-US" altLang="zh-CN" sz="1400" smtClean="0">
+                <a:latin typeface="华文楷体" panose="02010600040101010101" pitchFamily="2" charset="-122"/>
+                <a:ea typeface="华文楷体" panose="02010600040101010101" pitchFamily="2" charset="-122"/>
+              </a:rPr>
+              <a:t>id</a:t>
+            </a:r>
+            <a:r>
+              <a:rPr lang="zh-CN" altLang="en-US" sz="1400" smtClean="0">
+                <a:latin typeface="华文楷体" panose="02010600040101010101" pitchFamily="2" charset="-122"/>
+                <a:ea typeface="华文楷体" panose="02010600040101010101" pitchFamily="2" charset="-122"/>
+              </a:rPr>
+              <a:t>，但如果</a:t>
+            </a:r>
+            <a:r>
+              <a:rPr lang="en-US" altLang="zh-CN" sz="1400" smtClean="0">
+                <a:latin typeface="华文楷体" panose="02010600040101010101" pitchFamily="2" charset="-122"/>
+                <a:ea typeface="华文楷体" panose="02010600040101010101" pitchFamily="2" charset="-122"/>
+              </a:rPr>
+              <a:t>relayNum</a:t>
+            </a:r>
+            <a:r>
+              <a:rPr lang="zh-CN" altLang="en-US" sz="1400" smtClean="0">
+                <a:latin typeface="华文楷体" panose="02010600040101010101" pitchFamily="2" charset="-122"/>
+                <a:ea typeface="华文楷体" panose="02010600040101010101" pitchFamily="2" charset="-122"/>
+              </a:rPr>
+              <a:t>是</a:t>
+            </a:r>
+            <a:r>
+              <a:rPr lang="en-US" altLang="zh-CN" sz="1400" smtClean="0">
+                <a:latin typeface="华文楷体" panose="02010600040101010101" pitchFamily="2" charset="-122"/>
+                <a:ea typeface="华文楷体" panose="02010600040101010101" pitchFamily="2" charset="-122"/>
+              </a:rPr>
+              <a:t>2</a:t>
+            </a:r>
+            <a:r>
+              <a:rPr lang="zh-CN" altLang="en-US" sz="1400" smtClean="0">
+                <a:latin typeface="华文楷体" panose="02010600040101010101" pitchFamily="2" charset="-122"/>
+                <a:ea typeface="华文楷体" panose="02010600040101010101" pitchFamily="2" charset="-122"/>
+              </a:rPr>
+              <a:t>，那么后面</a:t>
+            </a:r>
+            <a:r>
+              <a:rPr lang="en-US" altLang="zh-CN" sz="1400" smtClean="0">
+                <a:latin typeface="华文楷体" panose="02010600040101010101" pitchFamily="2" charset="-122"/>
+                <a:ea typeface="华文楷体" panose="02010600040101010101" pitchFamily="2" charset="-122"/>
+              </a:rPr>
+              <a:t>2</a:t>
+            </a:r>
+            <a:r>
+              <a:rPr lang="zh-CN" altLang="en-US" sz="1400" smtClean="0">
+                <a:latin typeface="华文楷体" panose="02010600040101010101" pitchFamily="2" charset="-122"/>
+                <a:ea typeface="华文楷体" panose="02010600040101010101" pitchFamily="2" charset="-122"/>
+              </a:rPr>
+              <a:t>个</a:t>
+            </a:r>
+            <a:r>
+              <a:rPr lang="en-US" altLang="zh-CN" sz="1400" smtClean="0">
+                <a:latin typeface="华文楷体" panose="02010600040101010101" pitchFamily="2" charset="-122"/>
+                <a:ea typeface="华文楷体" panose="02010600040101010101" pitchFamily="2" charset="-122"/>
+              </a:rPr>
+              <a:t>id</a:t>
+            </a:r>
+            <a:r>
+              <a:rPr lang="zh-CN" altLang="en-US" sz="1400" smtClean="0">
+                <a:latin typeface="华文楷体" panose="02010600040101010101" pitchFamily="2" charset="-122"/>
+                <a:ea typeface="华文楷体" panose="02010600040101010101" pitchFamily="2" charset="-122"/>
+              </a:rPr>
+              <a:t>无效，即不用清空后两个</a:t>
+            </a:r>
+            <a:r>
+              <a:rPr lang="en-US" altLang="zh-CN" sz="1400" smtClean="0">
+                <a:latin typeface="华文楷体" panose="02010600040101010101" pitchFamily="2" charset="-122"/>
+                <a:ea typeface="华文楷体" panose="02010600040101010101" pitchFamily="2" charset="-122"/>
+              </a:rPr>
+              <a:t>id</a:t>
+            </a:r>
+            <a:r>
+              <a:rPr lang="zh-CN" altLang="en-US" sz="1400">
+                <a:latin typeface="华文楷体" panose="02010600040101010101" pitchFamily="2" charset="-122"/>
+                <a:ea typeface="华文楷体" panose="02010600040101010101" pitchFamily="2" charset="-122"/>
+              </a:rPr>
+              <a:t>（</a:t>
+            </a:r>
+            <a:r>
+              <a:rPr lang="zh-CN" altLang="en-US" sz="1400" smtClean="0">
+                <a:latin typeface="华文楷体" panose="02010600040101010101" pitchFamily="2" charset="-122"/>
+                <a:ea typeface="华文楷体" panose="02010600040101010101" pitchFamily="2" charset="-122"/>
+              </a:rPr>
+              <a:t>就算清空它的</a:t>
+            </a:r>
+            <a:r>
+              <a:rPr lang="en-US" altLang="zh-CN" sz="1400" smtClean="0">
+                <a:latin typeface="华文楷体" panose="02010600040101010101" pitchFamily="2" charset="-122"/>
+                <a:ea typeface="华文楷体" panose="02010600040101010101" pitchFamily="2" charset="-122"/>
+              </a:rPr>
+              <a:t>id</a:t>
+            </a:r>
+            <a:r>
+              <a:rPr lang="zh-CN" altLang="en-US" sz="1400" smtClean="0">
+                <a:latin typeface="华文楷体" panose="02010600040101010101" pitchFamily="2" charset="-122"/>
+                <a:ea typeface="华文楷体" panose="02010600040101010101" pitchFamily="2" charset="-122"/>
+              </a:rPr>
+              <a:t>还是一个值</a:t>
+            </a:r>
+            <a:r>
+              <a:rPr lang="en-US" altLang="zh-CN" sz="1400" smtClean="0">
+                <a:latin typeface="华文楷体" panose="02010600040101010101" pitchFamily="2" charset="-122"/>
+                <a:ea typeface="华文楷体" panose="02010600040101010101" pitchFamily="2" charset="-122"/>
+              </a:rPr>
+              <a:t>0</a:t>
+            </a:r>
+            <a:r>
+              <a:rPr lang="zh-CN" altLang="en-US" sz="1400">
+                <a:latin typeface="华文楷体" panose="02010600040101010101" pitchFamily="2" charset="-122"/>
+                <a:ea typeface="华文楷体" panose="02010600040101010101" pitchFamily="2" charset="-122"/>
+              </a:rPr>
+              <a:t>）</a:t>
+            </a:r>
+            <a:r>
+              <a:rPr lang="zh-CN" altLang="en-US" sz="1400" smtClean="0">
+                <a:latin typeface="华文楷体" panose="02010600040101010101" pitchFamily="2" charset="-122"/>
+                <a:ea typeface="华文楷体" panose="02010600040101010101" pitchFamily="2" charset="-122"/>
+              </a:rPr>
+              <a:t>只需将</a:t>
+            </a:r>
+            <a:r>
+              <a:rPr lang="en-US" altLang="zh-CN" sz="1400" smtClean="0">
+                <a:latin typeface="华文楷体" panose="02010600040101010101" pitchFamily="2" charset="-122"/>
+                <a:ea typeface="华文楷体" panose="02010600040101010101" pitchFamily="2" charset="-122"/>
+              </a:rPr>
+              <a:t>relayNum=2</a:t>
+            </a:r>
+            <a:r>
+              <a:rPr lang="zh-CN" altLang="en-US" sz="1400" smtClean="0">
+                <a:latin typeface="华文楷体" panose="02010600040101010101" pitchFamily="2" charset="-122"/>
+                <a:ea typeface="华文楷体" panose="02010600040101010101" pitchFamily="2" charset="-122"/>
+              </a:rPr>
+              <a:t>即可）</a:t>
+            </a:r>
+            <a:endParaRPr lang="en-US" altLang="zh-CN" sz="1400" smtClean="0">
+              <a:latin typeface="华文楷体" panose="02010600040101010101" pitchFamily="2" charset="-122"/>
+              <a:ea typeface="华文楷体" panose="02010600040101010101" pitchFamily="2" charset="-122"/>
+            </a:endParaRPr>
+          </a:p>
+          <a:p>
+            <a:pPr algn="ctr"/>
+            <a:endParaRPr lang="en-US" altLang="zh-CN" sz="1400">
+              <a:latin typeface="华文楷体" panose="02010600040101010101" pitchFamily="2" charset="-122"/>
+              <a:ea typeface="华文楷体" panose="02010600040101010101" pitchFamily="2" charset="-122"/>
+            </a:endParaRPr>
+          </a:p>
+          <a:p>
+            <a:pPr algn="ctr"/>
+            <a:r>
+              <a:rPr lang="zh-CN" altLang="en-US" sz="1400" smtClean="0">
+                <a:latin typeface="华文楷体" panose="02010600040101010101" pitchFamily="2" charset="-122"/>
+                <a:ea typeface="华文楷体" panose="02010600040101010101" pitchFamily="2" charset="-122"/>
+              </a:rPr>
+              <a:t>该理解是比较重要的，因为在非</a:t>
+            </a:r>
+            <a:r>
+              <a:rPr lang="en-US" altLang="zh-CN" sz="1400" smtClean="0">
+                <a:latin typeface="华文楷体" panose="02010600040101010101" pitchFamily="2" charset="-122"/>
+                <a:ea typeface="华文楷体" panose="02010600040101010101" pitchFamily="2" charset="-122"/>
+              </a:rPr>
+              <a:t>MATRIX</a:t>
+            </a:r>
+            <a:r>
+              <a:rPr lang="zh-CN" altLang="en-US" sz="1400" smtClean="0">
+                <a:latin typeface="华文楷体" panose="02010600040101010101" pitchFamily="2" charset="-122"/>
+                <a:ea typeface="华文楷体" panose="02010600040101010101" pitchFamily="2" charset="-122"/>
+              </a:rPr>
+              <a:t>策略中，</a:t>
+            </a:r>
+            <a:r>
+              <a:rPr lang="en-US" altLang="zh-CN" sz="1400" smtClean="0">
+                <a:latin typeface="华文楷体" panose="02010600040101010101" pitchFamily="2" charset="-122"/>
+                <a:ea typeface="华文楷体" panose="02010600040101010101" pitchFamily="2" charset="-122"/>
+              </a:rPr>
+              <a:t>pdu</a:t>
+            </a:r>
+            <a:r>
+              <a:rPr lang="zh-CN" altLang="en-US" sz="1400" smtClean="0">
+                <a:latin typeface="华文楷体" panose="02010600040101010101" pitchFamily="2" charset="-122"/>
+                <a:ea typeface="华文楷体" panose="02010600040101010101" pitchFamily="2" charset="-122"/>
+              </a:rPr>
+              <a:t>和所有枪都有关系，某把枪的</a:t>
+            </a:r>
+            <a:r>
+              <a:rPr lang="en-US" altLang="zh-CN" sz="1400" smtClean="0">
+                <a:latin typeface="华文楷体" panose="02010600040101010101" pitchFamily="2" charset="-122"/>
+                <a:ea typeface="华文楷体" panose="02010600040101010101" pitchFamily="2" charset="-122"/>
+              </a:rPr>
+              <a:t>g_resAry[gunid].relayId[]</a:t>
+            </a:r>
+            <a:r>
+              <a:rPr lang="zh-CN" altLang="en-US" sz="1400" smtClean="0">
+                <a:latin typeface="华文楷体" panose="02010600040101010101" pitchFamily="2" charset="-122"/>
+                <a:ea typeface="华文楷体" panose="02010600040101010101" pitchFamily="2" charset="-122"/>
+              </a:rPr>
+              <a:t>同样可能连接着另一把枪</a:t>
+            </a:r>
+            <a:endParaRPr lang="en-US" altLang="zh-CN" sz="1400" smtClean="0">
+              <a:latin typeface="华文楷体" panose="02010600040101010101" pitchFamily="2" charset="-122"/>
+              <a:ea typeface="华文楷体" panose="02010600040101010101" pitchFamily="2" charset="-122"/>
+            </a:endParaRPr>
+          </a:p>
+          <a:p>
+            <a:pPr algn="ctr"/>
+            <a:endParaRPr lang="en-US" altLang="zh-CN" sz="1400">
+              <a:latin typeface="华文楷体" panose="02010600040101010101" pitchFamily="2" charset="-122"/>
+              <a:ea typeface="华文楷体" panose="02010600040101010101" pitchFamily="2" charset="-122"/>
+            </a:endParaRPr>
+          </a:p>
+          <a:p>
+            <a:pPr algn="ctr"/>
+            <a:r>
+              <a:rPr lang="zh-CN" altLang="en-US" sz="1400" b="1" smtClean="0">
+                <a:latin typeface="华文楷体" panose="02010600040101010101" pitchFamily="2" charset="-122"/>
+                <a:ea typeface="华文楷体" panose="02010600040101010101" pitchFamily="2" charset="-122"/>
+              </a:rPr>
+              <a:t>比如在美标的</a:t>
+            </a:r>
+            <a:r>
+              <a:rPr lang="en-US" altLang="zh-CN" sz="1400" b="1" smtClean="0">
+                <a:latin typeface="华文楷体" panose="02010600040101010101" pitchFamily="2" charset="-122"/>
+                <a:ea typeface="华文楷体" panose="02010600040101010101" pitchFamily="2" charset="-122"/>
+              </a:rPr>
+              <a:t>HAND2HAND</a:t>
+            </a:r>
+            <a:r>
+              <a:rPr lang="zh-CN" altLang="en-US" sz="1400" b="1" smtClean="0">
+                <a:latin typeface="华文楷体" panose="02010600040101010101" pitchFamily="2" charset="-122"/>
+                <a:ea typeface="华文楷体" panose="02010600040101010101" pitchFamily="2" charset="-122"/>
+              </a:rPr>
+              <a:t>策略中，有时候</a:t>
+            </a:r>
+            <a:r>
+              <a:rPr lang="en-US" altLang="zh-CN" sz="1400" b="1" smtClean="0">
+                <a:latin typeface="华文楷体" panose="02010600040101010101" pitchFamily="2" charset="-122"/>
+                <a:ea typeface="华文楷体" panose="02010600040101010101" pitchFamily="2" charset="-122"/>
+              </a:rPr>
+              <a:t>pdu1</a:t>
+            </a:r>
+            <a:r>
+              <a:rPr lang="zh-CN" altLang="en-US" sz="1400" b="1" smtClean="0">
+                <a:latin typeface="华文楷体" panose="02010600040101010101" pitchFamily="2" charset="-122"/>
+                <a:ea typeface="华文楷体" panose="02010600040101010101" pitchFamily="2" charset="-122"/>
+              </a:rPr>
+              <a:t>是枪</a:t>
+            </a:r>
+            <a:r>
+              <a:rPr lang="en-US" altLang="zh-CN" sz="1400" b="1" smtClean="0">
+                <a:latin typeface="华文楷体" panose="02010600040101010101" pitchFamily="2" charset="-122"/>
+                <a:ea typeface="华文楷体" panose="02010600040101010101" pitchFamily="2" charset="-122"/>
+              </a:rPr>
+              <a:t>1</a:t>
+            </a:r>
+            <a:r>
+              <a:rPr lang="zh-CN" altLang="en-US" sz="1400" b="1" smtClean="0">
+                <a:latin typeface="华文楷体" panose="02010600040101010101" pitchFamily="2" charset="-122"/>
+                <a:ea typeface="华文楷体" panose="02010600040101010101" pitchFamily="2" charset="-122"/>
+              </a:rPr>
+              <a:t>的，有时候</a:t>
+            </a:r>
+            <a:r>
+              <a:rPr lang="en-US" altLang="zh-CN" sz="1400" b="1" smtClean="0">
+                <a:latin typeface="华文楷体" panose="02010600040101010101" pitchFamily="2" charset="-122"/>
+                <a:ea typeface="华文楷体" panose="02010600040101010101" pitchFamily="2" charset="-122"/>
+              </a:rPr>
+              <a:t>pdu1</a:t>
+            </a:r>
+            <a:r>
+              <a:rPr lang="zh-CN" altLang="en-US" sz="1400" b="1" smtClean="0">
+                <a:latin typeface="华文楷体" panose="02010600040101010101" pitchFamily="2" charset="-122"/>
+                <a:ea typeface="华文楷体" panose="02010600040101010101" pitchFamily="2" charset="-122"/>
+              </a:rPr>
+              <a:t>和</a:t>
+            </a:r>
+            <a:r>
+              <a:rPr lang="en-US" altLang="zh-CN" sz="1400" b="1" smtClean="0">
+                <a:latin typeface="华文楷体" panose="02010600040101010101" pitchFamily="2" charset="-122"/>
+                <a:ea typeface="华文楷体" panose="02010600040101010101" pitchFamily="2" charset="-122"/>
+              </a:rPr>
+              <a:t>pdu2</a:t>
+            </a:r>
+            <a:r>
+              <a:rPr lang="zh-CN" altLang="en-US" sz="1400" b="1" smtClean="0">
+                <a:latin typeface="华文楷体" panose="02010600040101010101" pitchFamily="2" charset="-122"/>
+                <a:ea typeface="华文楷体" panose="02010600040101010101" pitchFamily="2" charset="-122"/>
+              </a:rPr>
+              <a:t>都是枪</a:t>
+            </a:r>
+            <a:r>
+              <a:rPr lang="en-US" altLang="zh-CN" sz="1400" b="1" smtClean="0">
+                <a:latin typeface="华文楷体" panose="02010600040101010101" pitchFamily="2" charset="-122"/>
+                <a:ea typeface="华文楷体" panose="02010600040101010101" pitchFamily="2" charset="-122"/>
+              </a:rPr>
+              <a:t>2</a:t>
+            </a:r>
+            <a:r>
+              <a:rPr lang="zh-CN" altLang="en-US" sz="1400" b="1" smtClean="0">
+                <a:latin typeface="华文楷体" panose="02010600040101010101" pitchFamily="2" charset="-122"/>
+                <a:ea typeface="华文楷体" panose="02010600040101010101" pitchFamily="2" charset="-122"/>
+              </a:rPr>
+              <a:t>的等等</a:t>
+            </a:r>
+            <a:endParaRPr lang="zh-CN" altLang="en-US" sz="1400" b="1">
+              <a:latin typeface="华文楷体" panose="02010600040101010101" pitchFamily="2" charset="-122"/>
+              <a:ea typeface="华文楷体" panose="02010600040101010101" pitchFamily="2" charset="-122"/>
+            </a:endParaRPr>
           </a:p>
         </p:txBody>
       </p:sp>

</xml_diff>